<commit_message>
Deleted PPT and Updated V2
</commit_message>
<xml_diff>
--- a/O3_presentation_V2.pptx
+++ b/O3_presentation_V2.pptx
@@ -5,31 +5,32 @@
     <p:sldMasterId id="2147483660" r:id="rId1"/>
   </p:sldMasterIdLst>
   <p:notesMasterIdLst>
-    <p:notesMasterId r:id="rId24"/>
+    <p:notesMasterId r:id="rId25"/>
   </p:notesMasterIdLst>
   <p:sldIdLst>
-    <p:sldId id="257" r:id="rId2"/>
-    <p:sldId id="258" r:id="rId3"/>
-    <p:sldId id="259" r:id="rId4"/>
-    <p:sldId id="266" r:id="rId5"/>
-    <p:sldId id="262" r:id="rId6"/>
-    <p:sldId id="276" r:id="rId7"/>
-    <p:sldId id="269" r:id="rId8"/>
-    <p:sldId id="277" r:id="rId9"/>
-    <p:sldId id="278" r:id="rId10"/>
-    <p:sldId id="279" r:id="rId11"/>
-    <p:sldId id="263" r:id="rId12"/>
-    <p:sldId id="280" r:id="rId13"/>
-    <p:sldId id="281" r:id="rId14"/>
-    <p:sldId id="274" r:id="rId15"/>
-    <p:sldId id="268" r:id="rId16"/>
-    <p:sldId id="260" r:id="rId17"/>
-    <p:sldId id="261" r:id="rId18"/>
-    <p:sldId id="270" r:id="rId19"/>
-    <p:sldId id="271" r:id="rId20"/>
-    <p:sldId id="272" r:id="rId21"/>
-    <p:sldId id="273" r:id="rId22"/>
-    <p:sldId id="275" r:id="rId23"/>
+    <p:sldId id="256" r:id="rId2"/>
+    <p:sldId id="257" r:id="rId3"/>
+    <p:sldId id="258" r:id="rId4"/>
+    <p:sldId id="259" r:id="rId5"/>
+    <p:sldId id="266" r:id="rId6"/>
+    <p:sldId id="262" r:id="rId7"/>
+    <p:sldId id="276" r:id="rId8"/>
+    <p:sldId id="269" r:id="rId9"/>
+    <p:sldId id="277" r:id="rId10"/>
+    <p:sldId id="278" r:id="rId11"/>
+    <p:sldId id="279" r:id="rId12"/>
+    <p:sldId id="263" r:id="rId13"/>
+    <p:sldId id="280" r:id="rId14"/>
+    <p:sldId id="281" r:id="rId15"/>
+    <p:sldId id="274" r:id="rId16"/>
+    <p:sldId id="268" r:id="rId17"/>
+    <p:sldId id="260" r:id="rId18"/>
+    <p:sldId id="261" r:id="rId19"/>
+    <p:sldId id="270" r:id="rId20"/>
+    <p:sldId id="271" r:id="rId21"/>
+    <p:sldId id="272" r:id="rId22"/>
+    <p:sldId id="273" r:id="rId23"/>
+    <p:sldId id="275" r:id="rId24"/>
   </p:sldIdLst>
   <p:sldSz cx="12192000" cy="6858000"/>
   <p:notesSz cx="6858000" cy="9144000"/>
@@ -13680,7 +13681,105 @@
           <p:cNvPr id="2" name="Title 1">
             <a:extLst>
               <a:ext uri="{FF2B5EF4-FFF2-40B4-BE49-F238E27FC236}">
-                <a16:creationId xmlns:a16="http://schemas.microsoft.com/office/drawing/2014/main" id="{0148C890-0A4A-49E3-8086-5DEAD3FD878F}"/>
+                <a16:creationId xmlns:a16="http://schemas.microsoft.com/office/drawing/2014/main" id="{820457DB-14B8-4494-85CC-0F115FD89345}"/>
+              </a:ext>
+            </a:extLst>
+          </p:cNvPr>
+          <p:cNvSpPr>
+            <a:spLocks noGrp="1"/>
+          </p:cNvSpPr>
+          <p:nvPr>
+            <p:ph type="ctrTitle"/>
+          </p:nvPr>
+        </p:nvSpPr>
+        <p:spPr/>
+        <p:txBody>
+          <a:bodyPr/>
+          <a:lstStyle/>
+          <a:p>
+            <a:r>
+              <a:rPr lang="en-AU" dirty="0"/>
+              <a:t>Obesity, Obesity, Obesity</a:t>
+            </a:r>
+          </a:p>
+        </p:txBody>
+      </p:sp>
+      <p:sp>
+        <p:nvSpPr>
+          <p:cNvPr id="3" name="Subtitle 2">
+            <a:extLst>
+              <a:ext uri="{FF2B5EF4-FFF2-40B4-BE49-F238E27FC236}">
+                <a16:creationId xmlns:a16="http://schemas.microsoft.com/office/drawing/2014/main" id="{3AB3EB8F-F770-4705-9F01-0BA780652571}"/>
+              </a:ext>
+            </a:extLst>
+          </p:cNvPr>
+          <p:cNvSpPr>
+            <a:spLocks noGrp="1"/>
+          </p:cNvSpPr>
+          <p:nvPr>
+            <p:ph type="subTitle" idx="1"/>
+          </p:nvPr>
+        </p:nvSpPr>
+        <p:spPr/>
+        <p:txBody>
+          <a:bodyPr/>
+          <a:lstStyle/>
+          <a:p>
+            <a:r>
+              <a:rPr lang="en-AU" dirty="0" err="1"/>
+              <a:t>Tacklin</a:t>
+            </a:r>
+            <a:r>
+              <a:rPr lang="en-AU" dirty="0"/>
+              <a:t>’ Obesity in ‘</a:t>
+            </a:r>
+            <a:r>
+              <a:rPr lang="en-AU" dirty="0" err="1"/>
+              <a:t>Merica</a:t>
+            </a:r>
+            <a:r>
+              <a:rPr lang="en-AU" dirty="0"/>
+              <a:t> </a:t>
+            </a:r>
+          </a:p>
+        </p:txBody>
+      </p:sp>
+    </p:spTree>
+    <p:extLst>
+      <p:ext uri="{BB962C8B-B14F-4D97-AF65-F5344CB8AC3E}">
+        <p14:creationId xmlns:p14="http://schemas.microsoft.com/office/powerpoint/2010/main" val="3302465220"/>
+      </p:ext>
+    </p:extLst>
+  </p:cSld>
+  <p:clrMapOvr>
+    <a:masterClrMapping/>
+  </p:clrMapOvr>
+</p:sld>
+</file>
+
+<file path=ppt/slides/slide10.xml><?xml version="1.0" encoding="utf-8"?>
+<p:sld xmlns:a="http://schemas.openxmlformats.org/drawingml/2006/main" xmlns:r="http://schemas.openxmlformats.org/officeDocument/2006/relationships" xmlns:p="http://schemas.openxmlformats.org/presentationml/2006/main">
+  <p:cSld>
+    <p:spTree>
+      <p:nvGrpSpPr>
+        <p:cNvPr id="1" name=""/>
+        <p:cNvGrpSpPr/>
+        <p:nvPr/>
+      </p:nvGrpSpPr>
+      <p:grpSpPr>
+        <a:xfrm>
+          <a:off x="0" y="0"/>
+          <a:ext cx="0" cy="0"/>
+          <a:chOff x="0" y="0"/>
+          <a:chExt cx="0" cy="0"/>
+        </a:xfrm>
+      </p:grpSpPr>
+      <p:sp>
+        <p:nvSpPr>
+          <p:cNvPr id="2" name="Title 1">
+            <a:extLst>
+              <a:ext uri="{FF2B5EF4-FFF2-40B4-BE49-F238E27FC236}">
+                <a16:creationId xmlns:a16="http://schemas.microsoft.com/office/drawing/2014/main" id="{65395B54-E758-4630-AA1F-47AC01C17D3B}"/>
               </a:ext>
             </a:extLst>
           </p:cNvPr>
@@ -13698,173 +13797,404 @@
           <a:p>
             <a:r>
               <a:rPr lang="en-AU" dirty="0"/>
-              <a:t>Project Introduction	</a:t>
+              <a:t>RELATIONSHIP (POPULATION VS FAST FOOD RESTAURANTS)</a:t>
             </a:r>
           </a:p>
         </p:txBody>
       </p:sp>
       <p:sp>
         <p:nvSpPr>
-          <p:cNvPr id="3" name="Content Placeholder 2">
+          <p:cNvPr id="9" name="Rectangle 1">
             <a:extLst>
               <a:ext uri="{FF2B5EF4-FFF2-40B4-BE49-F238E27FC236}">
-                <a16:creationId xmlns:a16="http://schemas.microsoft.com/office/drawing/2014/main" id="{F37675AD-20F2-4A1C-8C45-DFAD2C88EA90}"/>
+                <a16:creationId xmlns:a16="http://schemas.microsoft.com/office/drawing/2014/main" id="{AAF0AD85-B5C3-4760-BA51-3272B5BF7C30}"/>
               </a:ext>
             </a:extLst>
           </p:cNvPr>
           <p:cNvSpPr>
-            <a:spLocks noGrp="1"/>
+            <a:spLocks noChangeArrowheads="1"/>
           </p:cNvSpPr>
+          <p:nvPr/>
+        </p:nvSpPr>
+        <p:spPr bwMode="auto">
+          <a:xfrm>
+            <a:off x="0" y="0"/>
+            <a:ext cx="12192000" cy="457200"/>
+          </a:xfrm>
+          <a:prstGeom prst="rect">
+            <a:avLst/>
+          </a:prstGeom>
+          <a:solidFill>
+            <a:srgbClr val="FFFFFF"/>
+          </a:solidFill>
+          <a:ln>
+            <a:noFill/>
+          </a:ln>
+          <a:effectLst/>
+          <a:extLst>
+            <a:ext uri="{91240B29-F687-4F45-9708-019B960494DF}">
+              <a14:hiddenLine xmlns:a14="http://schemas.microsoft.com/office/drawing/2010/main" w="9525">
+                <a:solidFill>
+                  <a:schemeClr val="tx1"/>
+                </a:solidFill>
+                <a:miter lim="800000"/>
+                <a:headEnd/>
+                <a:tailEnd/>
+              </a14:hiddenLine>
+            </a:ext>
+            <a:ext uri="{AF507438-7753-43E0-B8FC-AC1667EBCBE1}">
+              <a14:hiddenEffects xmlns:a14="http://schemas.microsoft.com/office/drawing/2010/main">
+                <a:effectLst>
+                  <a:outerShdw dist="35921" dir="2700000" algn="ctr" rotWithShape="0">
+                    <a:schemeClr val="bg2"/>
+                  </a:outerShdw>
+                </a:effectLst>
+              </a14:hiddenEffects>
+            </a:ext>
+          </a:extLst>
+        </p:spPr>
+        <p:txBody>
+          <a:bodyPr vert="horz" wrap="none" lIns="0" tIns="0" rIns="0" bIns="0" numCol="1" anchor="ctr" anchorCtr="0" compatLnSpc="1">
+            <a:prstTxWarp prst="textNoShape">
+              <a:avLst/>
+            </a:prstTxWarp>
+            <a:spAutoFit/>
+          </a:bodyPr>
+          <a:lstStyle/>
+          <a:p>
+            <a:pPr marL="0" marR="0" lvl="0" indent="0" algn="l" defTabSz="914400" rtl="0" eaLnBrk="0" fontAlgn="base" latinLnBrk="0" hangingPunct="0">
+              <a:lnSpc>
+                <a:spcPct val="100000"/>
+              </a:lnSpc>
+              <a:spcBef>
+                <a:spcPct val="0"/>
+              </a:spcBef>
+              <a:spcAft>
+                <a:spcPct val="0"/>
+              </a:spcAft>
+              <a:buClrTx/>
+              <a:buSzTx/>
+              <a:buFontTx/>
+              <a:buNone/>
+              <a:tabLst/>
+            </a:pPr>
+            <a:r>
+              <a:rPr kumimoji="0" lang="en-US" altLang="en-US" sz="1000" b="0" i="0" u="none" strike="noStrike" cap="none" normalizeH="0" baseline="0">
+                <a:ln>
+                  <a:noFill/>
+                </a:ln>
+                <a:solidFill>
+                  <a:srgbClr val="000000"/>
+                </a:solidFill>
+                <a:effectLst/>
+                <a:latin typeface="Courier New" panose="02070309020205020404" pitchFamily="49" charset="0"/>
+              </a:rPr>
+              <a:t>The correlation between both factors is 0.75</a:t>
+            </a:r>
+            <a:r>
+              <a:rPr kumimoji="0" lang="en-US" altLang="en-US" sz="800" b="0" i="0" u="none" strike="noStrike" cap="none" normalizeH="0" baseline="0">
+                <a:ln>
+                  <a:noFill/>
+                </a:ln>
+                <a:solidFill>
+                  <a:schemeClr val="tx1"/>
+                </a:solidFill>
+                <a:effectLst/>
+              </a:rPr>
+              <a:t> </a:t>
+            </a:r>
+            <a:endParaRPr kumimoji="0" lang="en-US" altLang="en-US" sz="1800" b="0" i="0" u="none" strike="noStrike" cap="none" normalizeH="0" baseline="0">
+              <a:ln>
+                <a:noFill/>
+              </a:ln>
+              <a:solidFill>
+                <a:schemeClr val="tx1"/>
+              </a:solidFill>
+              <a:effectLst/>
+              <a:latin typeface="Arial" panose="020B0604020202020204" pitchFamily="34" charset="0"/>
+            </a:endParaRPr>
+          </a:p>
+        </p:txBody>
+      </p:sp>
+      <p:sp>
+        <p:nvSpPr>
+          <p:cNvPr id="10" name="TextBox 9">
+            <a:extLst>
+              <a:ext uri="{FF2B5EF4-FFF2-40B4-BE49-F238E27FC236}">
+                <a16:creationId xmlns:a16="http://schemas.microsoft.com/office/drawing/2014/main" id="{BD99EE48-D14D-4ABC-96A1-64200ED7B86F}"/>
+              </a:ext>
+            </a:extLst>
+          </p:cNvPr>
+          <p:cNvSpPr txBox="1"/>
+          <p:nvPr/>
+        </p:nvSpPr>
+        <p:spPr>
+          <a:xfrm>
+            <a:off x="902812" y="6267450"/>
+            <a:ext cx="5067413" cy="369332"/>
+          </a:xfrm>
+          <a:prstGeom prst="rect">
+            <a:avLst/>
+          </a:prstGeom>
+          <a:noFill/>
+        </p:spPr>
+        <p:txBody>
+          <a:bodyPr wrap="none" rtlCol="0">
+            <a:spAutoFit/>
+          </a:bodyPr>
+          <a:lstStyle/>
+          <a:p>
+            <a:r>
+              <a:rPr lang="en-US" dirty="0"/>
+              <a:t>The correlation between both factors is 0.99</a:t>
+            </a:r>
+            <a:endParaRPr lang="en-AU" dirty="0"/>
+          </a:p>
+        </p:txBody>
+      </p:sp>
+      <p:sp>
+        <p:nvSpPr>
+          <p:cNvPr id="11" name="Rectangle 2">
+            <a:extLst>
+              <a:ext uri="{FF2B5EF4-FFF2-40B4-BE49-F238E27FC236}">
+                <a16:creationId xmlns:a16="http://schemas.microsoft.com/office/drawing/2014/main" id="{156E7540-53FE-476D-B803-F82DB68BFBF8}"/>
+              </a:ext>
+            </a:extLst>
+          </p:cNvPr>
+          <p:cNvSpPr>
+            <a:spLocks noChangeArrowheads="1"/>
+          </p:cNvSpPr>
+          <p:nvPr/>
+        </p:nvSpPr>
+        <p:spPr bwMode="auto">
+          <a:xfrm>
+            <a:off x="152400" y="152400"/>
+            <a:ext cx="12192000" cy="457200"/>
+          </a:xfrm>
+          <a:prstGeom prst="rect">
+            <a:avLst/>
+          </a:prstGeom>
+          <a:solidFill>
+            <a:srgbClr val="FFFFFF"/>
+          </a:solidFill>
+          <a:ln>
+            <a:noFill/>
+          </a:ln>
+          <a:effectLst/>
+          <a:extLst>
+            <a:ext uri="{91240B29-F687-4F45-9708-019B960494DF}">
+              <a14:hiddenLine xmlns:a14="http://schemas.microsoft.com/office/drawing/2010/main" w="9525">
+                <a:solidFill>
+                  <a:schemeClr val="tx1"/>
+                </a:solidFill>
+                <a:miter lim="800000"/>
+                <a:headEnd/>
+                <a:tailEnd/>
+              </a14:hiddenLine>
+            </a:ext>
+            <a:ext uri="{AF507438-7753-43E0-B8FC-AC1667EBCBE1}">
+              <a14:hiddenEffects xmlns:a14="http://schemas.microsoft.com/office/drawing/2010/main">
+                <a:effectLst>
+                  <a:outerShdw dist="35921" dir="2700000" algn="ctr" rotWithShape="0">
+                    <a:schemeClr val="bg2"/>
+                  </a:outerShdw>
+                </a:effectLst>
+              </a14:hiddenEffects>
+            </a:ext>
+          </a:extLst>
+        </p:spPr>
+        <p:txBody>
+          <a:bodyPr vert="horz" wrap="none" lIns="0" tIns="0" rIns="0" bIns="0" numCol="1" anchor="ctr" anchorCtr="0" compatLnSpc="1">
+            <a:prstTxWarp prst="textNoShape">
+              <a:avLst/>
+            </a:prstTxWarp>
+            <a:spAutoFit/>
+          </a:bodyPr>
+          <a:lstStyle/>
+          <a:p>
+            <a:pPr marL="0" marR="0" lvl="0" indent="0" algn="l" defTabSz="914400" rtl="0" eaLnBrk="0" fontAlgn="base" latinLnBrk="0" hangingPunct="0">
+              <a:lnSpc>
+                <a:spcPct val="100000"/>
+              </a:lnSpc>
+              <a:spcBef>
+                <a:spcPct val="0"/>
+              </a:spcBef>
+              <a:spcAft>
+                <a:spcPct val="0"/>
+              </a:spcAft>
+              <a:buClrTx/>
+              <a:buSzTx/>
+              <a:buFontTx/>
+              <a:buNone/>
+              <a:tabLst/>
+            </a:pPr>
+            <a:r>
+              <a:rPr kumimoji="0" lang="en-US" altLang="en-US" sz="1000" b="0" i="0" u="none" strike="noStrike" cap="none" normalizeH="0" baseline="0">
+                <a:ln>
+                  <a:noFill/>
+                </a:ln>
+                <a:solidFill>
+                  <a:srgbClr val="000000"/>
+                </a:solidFill>
+                <a:effectLst/>
+                <a:latin typeface="Courier New" panose="02070309020205020404" pitchFamily="49" charset="0"/>
+              </a:rPr>
+              <a:t>The correlation between both factors is 0.75</a:t>
+            </a:r>
+            <a:r>
+              <a:rPr kumimoji="0" lang="en-US" altLang="en-US" sz="800" b="0" i="0" u="none" strike="noStrike" cap="none" normalizeH="0" baseline="0">
+                <a:ln>
+                  <a:noFill/>
+                </a:ln>
+                <a:solidFill>
+                  <a:schemeClr val="tx1"/>
+                </a:solidFill>
+                <a:effectLst/>
+              </a:rPr>
+              <a:t> </a:t>
+            </a:r>
+            <a:endParaRPr kumimoji="0" lang="en-US" altLang="en-US" sz="1800" b="0" i="0" u="none" strike="noStrike" cap="none" normalizeH="0" baseline="0">
+              <a:ln>
+                <a:noFill/>
+              </a:ln>
+              <a:solidFill>
+                <a:schemeClr val="tx1"/>
+              </a:solidFill>
+              <a:effectLst/>
+              <a:latin typeface="Arial" panose="020B0604020202020204" pitchFamily="34" charset="0"/>
+            </a:endParaRPr>
+          </a:p>
+        </p:txBody>
+      </p:sp>
+      <p:sp>
+        <p:nvSpPr>
+          <p:cNvPr id="12" name="TextBox 11">
+            <a:extLst>
+              <a:ext uri="{FF2B5EF4-FFF2-40B4-BE49-F238E27FC236}">
+                <a16:creationId xmlns:a16="http://schemas.microsoft.com/office/drawing/2014/main" id="{EEB4A170-3B65-4376-9960-F38F59068B97}"/>
+              </a:ext>
+            </a:extLst>
+          </p:cNvPr>
+          <p:cNvSpPr txBox="1"/>
+          <p:nvPr/>
+        </p:nvSpPr>
+        <p:spPr>
+          <a:xfrm>
+            <a:off x="6027261" y="3124884"/>
+            <a:ext cx="6008376" cy="2585323"/>
+          </a:xfrm>
+          <a:prstGeom prst="rect">
+            <a:avLst/>
+          </a:prstGeom>
+          <a:noFill/>
+        </p:spPr>
+        <p:txBody>
+          <a:bodyPr wrap="none" rtlCol="0">
+            <a:spAutoFit/>
+          </a:bodyPr>
+          <a:lstStyle/>
+          <a:p>
+            <a:pPr marL="285750" indent="-285750">
+              <a:buFontTx/>
+              <a:buChar char="-"/>
+            </a:pPr>
+            <a:r>
+              <a:rPr lang="en-AU" dirty="0"/>
+              <a:t>The Scatter Chart Shows the relationship</a:t>
+            </a:r>
+          </a:p>
+          <a:p>
+            <a:r>
+              <a:rPr lang="en-AU" dirty="0"/>
+              <a:t>     between the increase in Fast-food Restaurants</a:t>
+            </a:r>
+          </a:p>
+          <a:p>
+            <a:r>
+              <a:rPr lang="en-AU" dirty="0"/>
+              <a:t>     vs increase in population</a:t>
+            </a:r>
+          </a:p>
+          <a:p>
+            <a:endParaRPr lang="en-AU" dirty="0"/>
+          </a:p>
+          <a:p>
+            <a:pPr marL="285750" indent="-285750">
+              <a:buFontTx/>
+              <a:buChar char="-"/>
+            </a:pPr>
+            <a:r>
+              <a:rPr lang="en-US" dirty="0"/>
+              <a:t>The more accessible the fast-food restaurant </a:t>
+            </a:r>
+          </a:p>
+          <a:p>
+            <a:r>
+              <a:rPr lang="en-US" dirty="0"/>
+              <a:t>    the higher the obesity rate</a:t>
+            </a:r>
+          </a:p>
+          <a:p>
+            <a:endParaRPr lang="en-US" dirty="0"/>
+          </a:p>
+          <a:p>
+            <a:pPr marL="285750" indent="-285750">
+              <a:buFontTx/>
+              <a:buChar char="-"/>
+            </a:pPr>
+            <a:r>
+              <a:rPr lang="en-US" dirty="0"/>
+              <a:t>Increasing in the Number of Fast-Food Outlets has</a:t>
+            </a:r>
+          </a:p>
+          <a:p>
+            <a:r>
+              <a:rPr lang="en-US" dirty="0"/>
+              <a:t>     a significant role in higher Obesity rate</a:t>
+            </a:r>
+            <a:endParaRPr lang="en-AU" dirty="0"/>
+          </a:p>
+        </p:txBody>
+      </p:sp>
+      <p:pic>
+        <p:nvPicPr>
+          <p:cNvPr id="6" name="Content Placeholder 5" descr="Chart, scatter chart&#10;&#10;Description automatically generated">
+            <a:extLst>
+              <a:ext uri="{FF2B5EF4-FFF2-40B4-BE49-F238E27FC236}">
+                <a16:creationId xmlns:a16="http://schemas.microsoft.com/office/drawing/2014/main" id="{7A3CB079-427F-445A-B5AE-A55FE39C44A2}"/>
+              </a:ext>
+            </a:extLst>
+          </p:cNvPr>
+          <p:cNvPicPr>
+            <a:picLocks noGrp="1" noChangeAspect="1"/>
+          </p:cNvPicPr>
           <p:nvPr>
             <p:ph idx="1"/>
           </p:nvPr>
-        </p:nvSpPr>
+        </p:nvPicPr>
+        <p:blipFill>
+          <a:blip r:embed="rId2">
+            <a:extLst>
+              <a:ext uri="{28A0092B-C50C-407E-A947-70E740481C1C}">
+                <a14:useLocalDpi xmlns:a14="http://schemas.microsoft.com/office/drawing/2010/main" val="0"/>
+              </a:ext>
+            </a:extLst>
+          </a:blip>
+          <a:stretch>
+            <a:fillRect/>
+          </a:stretch>
+        </p:blipFill>
         <p:spPr>
           <a:xfrm>
-            <a:off x="1154954" y="2348917"/>
-            <a:ext cx="8825659" cy="4353887"/>
+            <a:off x="487680" y="2374899"/>
+            <a:ext cx="5482545" cy="3655031"/>
           </a:xfrm>
         </p:spPr>
-        <p:txBody>
-          <a:bodyPr>
-            <a:normAutofit fontScale="92500" lnSpcReduction="10000"/>
-          </a:bodyPr>
-          <a:lstStyle/>
-          <a:p>
-            <a:r>
-              <a:rPr lang="en-US" b="0" i="0" dirty="0">
-                <a:effectLst/>
-                <a:latin typeface="-apple-system"/>
-              </a:rPr>
-              <a:t>What classifies someone as Obese? </a:t>
-            </a:r>
-          </a:p>
-          <a:p>
-            <a:pPr lvl="1"/>
-            <a:r>
-              <a:rPr lang="en-US" b="0" i="0" dirty="0">
-                <a:effectLst/>
-                <a:latin typeface="-apple-system"/>
-              </a:rPr>
-              <a:t>Body Mass Index (BMI) of over 30</a:t>
-            </a:r>
-            <a:r>
-              <a:rPr lang="en-US" b="0" i="0" u="none" strike="noStrike" baseline="-25000" dirty="0">
-                <a:effectLst/>
-                <a:latin typeface="-apple-system"/>
-                <a:hlinkClick r:id="rId2">
-                  <a:extLst>
-                    <a:ext uri="{A12FA001-AC4F-418D-AE19-62706E023703}">
-                      <ahyp:hlinkClr xmlns:ahyp="http://schemas.microsoft.com/office/drawing/2018/hyperlinkcolor" val="tx"/>
-                    </a:ext>
-                  </a:extLst>
-                </a:hlinkClick>
-              </a:rPr>
-              <a:t> [2]</a:t>
-            </a:r>
-            <a:endParaRPr lang="en-US" b="0" i="0" dirty="0">
-              <a:effectLst/>
-              <a:latin typeface="-apple-system"/>
-            </a:endParaRPr>
-          </a:p>
-          <a:p>
-            <a:r>
-              <a:rPr lang="en-US" dirty="0">
-                <a:latin typeface="-apple-system"/>
-              </a:rPr>
-              <a:t>What causes Obesity?</a:t>
-            </a:r>
-          </a:p>
-          <a:p>
-            <a:pPr lvl="1"/>
-            <a:r>
-              <a:rPr lang="en-US" b="0" i="0" dirty="0">
-                <a:effectLst/>
-                <a:latin typeface="-apple-system"/>
-              </a:rPr>
-              <a:t>Complex, combination of behavior and genetics</a:t>
-            </a:r>
-            <a:endParaRPr lang="en-US" dirty="0">
-              <a:latin typeface="-apple-system"/>
-            </a:endParaRPr>
-          </a:p>
-          <a:p>
-            <a:r>
-              <a:rPr lang="en-US" b="0" i="0" dirty="0">
-                <a:effectLst/>
-                <a:latin typeface="-apple-system"/>
-              </a:rPr>
-              <a:t>What we are looking for?</a:t>
-            </a:r>
-          </a:p>
-          <a:p>
-            <a:pPr lvl="1"/>
-            <a:r>
-              <a:rPr lang="en-US" b="0" i="0" dirty="0">
-                <a:effectLst/>
-                <a:latin typeface="-apple-system"/>
-              </a:rPr>
-              <a:t>Gathered data from various sources to identify the strength of the relationship between obesity and it’s contributing factors. </a:t>
-            </a:r>
-          </a:p>
-          <a:p>
-            <a:r>
-              <a:rPr lang="en-US" b="0" i="0" dirty="0">
-                <a:effectLst/>
-                <a:latin typeface="-apple-system"/>
-              </a:rPr>
-              <a:t>What we will be covering?</a:t>
-            </a:r>
-          </a:p>
-          <a:p>
-            <a:pPr lvl="1"/>
-            <a:r>
-              <a:rPr lang="en-US" dirty="0">
-                <a:latin typeface="-apple-system"/>
-              </a:rPr>
-              <a:t>Fast F</a:t>
-            </a:r>
-            <a:r>
-              <a:rPr lang="en-US" b="0" i="0" dirty="0">
-                <a:effectLst/>
-                <a:latin typeface="-apple-system"/>
-              </a:rPr>
-              <a:t>ood restaurants availability, public transport availability, physical activeness, and general public’s age group in the 50 states of United States of America.</a:t>
-            </a:r>
-          </a:p>
-          <a:p>
-            <a:r>
-              <a:rPr lang="en-US" dirty="0">
-                <a:latin typeface="-apple-system"/>
-              </a:rPr>
-              <a:t>Why?</a:t>
-            </a:r>
-          </a:p>
-          <a:p>
-            <a:pPr lvl="1"/>
-            <a:r>
-              <a:rPr lang="en-US" b="0" i="0" dirty="0">
-                <a:effectLst/>
-                <a:latin typeface="-apple-system"/>
-              </a:rPr>
-              <a:t>Obesity is serious because it is associated with poorer mental health outcomes and reduced quality of life. Obesity is also associated with the leading causes of death in the United States and worldwide, including diabetes, heart disease, stroke, and some types of cancer.</a:t>
-            </a:r>
-          </a:p>
-          <a:p>
-            <a:pPr marL="457200" lvl="1" indent="0">
-              <a:buNone/>
-            </a:pPr>
-            <a:endParaRPr lang="en-US" b="0" i="0" dirty="0">
-              <a:effectLst/>
-              <a:latin typeface="-apple-system"/>
-            </a:endParaRPr>
-          </a:p>
-        </p:txBody>
-      </p:sp>
+      </p:pic>
     </p:spTree>
     <p:extLst>
       <p:ext uri="{BB962C8B-B14F-4D97-AF65-F5344CB8AC3E}">
-        <p14:creationId xmlns:p14="http://schemas.microsoft.com/office/powerpoint/2010/main" val="2307991246"/>
+        <p14:creationId xmlns:p14="http://schemas.microsoft.com/office/powerpoint/2010/main" val="4138505094"/>
       </p:ext>
     </p:extLst>
   </p:cSld>
@@ -13874,7 +14204,7 @@
 </p:sld>
 </file>
 
-<file path=ppt/slides/slide10.xml><?xml version="1.0" encoding="utf-8"?>
+<file path=ppt/slides/slide11.xml><?xml version="1.0" encoding="utf-8"?>
 <p:sld xmlns:a="http://schemas.openxmlformats.org/drawingml/2006/main" xmlns:r="http://schemas.openxmlformats.org/officeDocument/2006/relationships" xmlns:p="http://schemas.openxmlformats.org/presentationml/2006/main">
   <p:cSld>
     <p:spTree>
@@ -14285,7 +14615,7 @@
 </p:sld>
 </file>
 
-<file path=ppt/slides/slide11.xml><?xml version="1.0" encoding="utf-8"?>
+<file path=ppt/slides/slide12.xml><?xml version="1.0" encoding="utf-8"?>
 <p:sld xmlns:a="http://schemas.openxmlformats.org/drawingml/2006/main" xmlns:r="http://schemas.openxmlformats.org/officeDocument/2006/relationships" xmlns:p="http://schemas.openxmlformats.org/presentationml/2006/main">
   <p:cSld>
     <p:spTree>
@@ -14494,7 +14824,7 @@
 </p:sld>
 </file>
 
-<file path=ppt/slides/slide12.xml><?xml version="1.0" encoding="utf-8"?>
+<file path=ppt/slides/slide13.xml><?xml version="1.0" encoding="utf-8"?>
 <p:sld xmlns:a="http://schemas.openxmlformats.org/drawingml/2006/main" xmlns:r="http://schemas.openxmlformats.org/officeDocument/2006/relationships" xmlns:p="http://schemas.openxmlformats.org/presentationml/2006/main">
   <p:cSld>
     <p:spTree>
@@ -14877,7 +15207,7 @@
 </p:sld>
 </file>
 
-<file path=ppt/slides/slide13.xml><?xml version="1.0" encoding="utf-8"?>
+<file path=ppt/slides/slide14.xml><?xml version="1.0" encoding="utf-8"?>
 <p:sld xmlns:a="http://schemas.openxmlformats.org/drawingml/2006/main" xmlns:r="http://schemas.openxmlformats.org/officeDocument/2006/relationships" xmlns:p="http://schemas.openxmlformats.org/presentationml/2006/main">
   <p:cSld>
     <p:spTree>
@@ -15078,7 +15408,7 @@
 </p:sld>
 </file>
 
-<file path=ppt/slides/slide14.xml><?xml version="1.0" encoding="utf-8"?>
+<file path=ppt/slides/slide15.xml><?xml version="1.0" encoding="utf-8"?>
 <p:sld xmlns:a="http://schemas.openxmlformats.org/drawingml/2006/main" xmlns:r="http://schemas.openxmlformats.org/officeDocument/2006/relationships" xmlns:p="http://schemas.openxmlformats.org/presentationml/2006/main">
   <p:cSld>
     <p:spTree>
@@ -15457,7 +15787,7 @@
 </p:sld>
 </file>
 
-<file path=ppt/slides/slide15.xml><?xml version="1.0" encoding="utf-8"?>
+<file path=ppt/slides/slide16.xml><?xml version="1.0" encoding="utf-8"?>
 <p:sld xmlns:a="http://schemas.openxmlformats.org/drawingml/2006/main" xmlns:r="http://schemas.openxmlformats.org/officeDocument/2006/relationships" xmlns:p="http://schemas.openxmlformats.org/presentationml/2006/main">
   <p:cSld>
     <p:spTree>
@@ -15646,7 +15976,7 @@
 </p:sld>
 </file>
 
-<file path=ppt/slides/slide16.xml><?xml version="1.0" encoding="utf-8"?>
+<file path=ppt/slides/slide17.xml><?xml version="1.0" encoding="utf-8"?>
 <p:sld xmlns:a="http://schemas.openxmlformats.org/drawingml/2006/main" xmlns:r="http://schemas.openxmlformats.org/officeDocument/2006/relationships" xmlns:p="http://schemas.openxmlformats.org/presentationml/2006/main">
   <p:cSld>
     <p:spTree>
@@ -15888,7 +16218,7 @@
 </p:sld>
 </file>
 
-<file path=ppt/slides/slide17.xml><?xml version="1.0" encoding="utf-8"?>
+<file path=ppt/slides/slide18.xml><?xml version="1.0" encoding="utf-8"?>
 <p:sld xmlns:a="http://schemas.openxmlformats.org/drawingml/2006/main" xmlns:r="http://schemas.openxmlformats.org/officeDocument/2006/relationships" xmlns:p="http://schemas.openxmlformats.org/presentationml/2006/main">
   <p:cSld>
     <p:spTree>
@@ -16381,7 +16711,7 @@
 </p:sld>
 </file>
 
-<file path=ppt/slides/slide18.xml><?xml version="1.0" encoding="utf-8"?>
+<file path=ppt/slides/slide19.xml><?xml version="1.0" encoding="utf-8"?>
 <p:sld xmlns:a="http://schemas.openxmlformats.org/drawingml/2006/main" xmlns:r="http://schemas.openxmlformats.org/officeDocument/2006/relationships" xmlns:p="http://schemas.openxmlformats.org/presentationml/2006/main">
   <p:cSld>
     <p:spTree>
@@ -16573,7 +16903,223 @@
 </p:sld>
 </file>
 
-<file path=ppt/slides/slide19.xml><?xml version="1.0" encoding="utf-8"?>
+<file path=ppt/slides/slide2.xml><?xml version="1.0" encoding="utf-8"?>
+<p:sld xmlns:a="http://schemas.openxmlformats.org/drawingml/2006/main" xmlns:r="http://schemas.openxmlformats.org/officeDocument/2006/relationships" xmlns:p="http://schemas.openxmlformats.org/presentationml/2006/main">
+  <p:cSld>
+    <p:spTree>
+      <p:nvGrpSpPr>
+        <p:cNvPr id="1" name=""/>
+        <p:cNvGrpSpPr/>
+        <p:nvPr/>
+      </p:nvGrpSpPr>
+      <p:grpSpPr>
+        <a:xfrm>
+          <a:off x="0" y="0"/>
+          <a:ext cx="0" cy="0"/>
+          <a:chOff x="0" y="0"/>
+          <a:chExt cx="0" cy="0"/>
+        </a:xfrm>
+      </p:grpSpPr>
+      <p:sp>
+        <p:nvSpPr>
+          <p:cNvPr id="2" name="Title 1">
+            <a:extLst>
+              <a:ext uri="{FF2B5EF4-FFF2-40B4-BE49-F238E27FC236}">
+                <a16:creationId xmlns:a16="http://schemas.microsoft.com/office/drawing/2014/main" id="{0148C890-0A4A-49E3-8086-5DEAD3FD878F}"/>
+              </a:ext>
+            </a:extLst>
+          </p:cNvPr>
+          <p:cNvSpPr>
+            <a:spLocks noGrp="1"/>
+          </p:cNvSpPr>
+          <p:nvPr>
+            <p:ph type="title"/>
+          </p:nvPr>
+        </p:nvSpPr>
+        <p:spPr/>
+        <p:txBody>
+          <a:bodyPr/>
+          <a:lstStyle/>
+          <a:p>
+            <a:r>
+              <a:rPr lang="en-AU" dirty="0"/>
+              <a:t>Project Introduction	</a:t>
+            </a:r>
+          </a:p>
+        </p:txBody>
+      </p:sp>
+      <p:sp>
+        <p:nvSpPr>
+          <p:cNvPr id="3" name="Content Placeholder 2">
+            <a:extLst>
+              <a:ext uri="{FF2B5EF4-FFF2-40B4-BE49-F238E27FC236}">
+                <a16:creationId xmlns:a16="http://schemas.microsoft.com/office/drawing/2014/main" id="{F37675AD-20F2-4A1C-8C45-DFAD2C88EA90}"/>
+              </a:ext>
+            </a:extLst>
+          </p:cNvPr>
+          <p:cNvSpPr>
+            <a:spLocks noGrp="1"/>
+          </p:cNvSpPr>
+          <p:nvPr>
+            <p:ph idx="1"/>
+          </p:nvPr>
+        </p:nvSpPr>
+        <p:spPr>
+          <a:xfrm>
+            <a:off x="1154954" y="2348917"/>
+            <a:ext cx="8825659" cy="4353887"/>
+          </a:xfrm>
+        </p:spPr>
+        <p:txBody>
+          <a:bodyPr>
+            <a:normAutofit fontScale="92500" lnSpcReduction="10000"/>
+          </a:bodyPr>
+          <a:lstStyle/>
+          <a:p>
+            <a:r>
+              <a:rPr lang="en-US" b="0" i="0" dirty="0">
+                <a:effectLst/>
+                <a:latin typeface="-apple-system"/>
+              </a:rPr>
+              <a:t>What classifies someone as Obese? </a:t>
+            </a:r>
+          </a:p>
+          <a:p>
+            <a:pPr lvl="1"/>
+            <a:r>
+              <a:rPr lang="en-US" b="0" i="0" dirty="0">
+                <a:effectLst/>
+                <a:latin typeface="-apple-system"/>
+              </a:rPr>
+              <a:t>Body Mass Index (BMI) of over 30</a:t>
+            </a:r>
+            <a:r>
+              <a:rPr lang="en-US" b="0" i="0" u="none" strike="noStrike" baseline="-25000" dirty="0">
+                <a:effectLst/>
+                <a:latin typeface="-apple-system"/>
+                <a:hlinkClick r:id="rId2">
+                  <a:extLst>
+                    <a:ext uri="{A12FA001-AC4F-418D-AE19-62706E023703}">
+                      <ahyp:hlinkClr xmlns:ahyp="http://schemas.microsoft.com/office/drawing/2018/hyperlinkcolor" val="tx"/>
+                    </a:ext>
+                  </a:extLst>
+                </a:hlinkClick>
+              </a:rPr>
+              <a:t> [2]</a:t>
+            </a:r>
+            <a:endParaRPr lang="en-US" b="0" i="0" dirty="0">
+              <a:effectLst/>
+              <a:latin typeface="-apple-system"/>
+            </a:endParaRPr>
+          </a:p>
+          <a:p>
+            <a:r>
+              <a:rPr lang="en-US" dirty="0">
+                <a:latin typeface="-apple-system"/>
+              </a:rPr>
+              <a:t>What causes Obesity?</a:t>
+            </a:r>
+          </a:p>
+          <a:p>
+            <a:pPr lvl="1"/>
+            <a:r>
+              <a:rPr lang="en-US" b="0" i="0" dirty="0">
+                <a:effectLst/>
+                <a:latin typeface="-apple-system"/>
+              </a:rPr>
+              <a:t>Complex, combination of behavior and genetics</a:t>
+            </a:r>
+            <a:endParaRPr lang="en-US" dirty="0">
+              <a:latin typeface="-apple-system"/>
+            </a:endParaRPr>
+          </a:p>
+          <a:p>
+            <a:r>
+              <a:rPr lang="en-US" b="0" i="0" dirty="0">
+                <a:effectLst/>
+                <a:latin typeface="-apple-system"/>
+              </a:rPr>
+              <a:t>What we are looking for?</a:t>
+            </a:r>
+          </a:p>
+          <a:p>
+            <a:pPr lvl="1"/>
+            <a:r>
+              <a:rPr lang="en-US" b="0" i="0" dirty="0">
+                <a:effectLst/>
+                <a:latin typeface="-apple-system"/>
+              </a:rPr>
+              <a:t>Gathered data from various sources to identify the strength of the relationship between obesity and it’s contributing factors. </a:t>
+            </a:r>
+          </a:p>
+          <a:p>
+            <a:r>
+              <a:rPr lang="en-US" b="0" i="0" dirty="0">
+                <a:effectLst/>
+                <a:latin typeface="-apple-system"/>
+              </a:rPr>
+              <a:t>What we will be covering?</a:t>
+            </a:r>
+          </a:p>
+          <a:p>
+            <a:pPr lvl="1"/>
+            <a:r>
+              <a:rPr lang="en-US" dirty="0">
+                <a:latin typeface="-apple-system"/>
+              </a:rPr>
+              <a:t>Fast F</a:t>
+            </a:r>
+            <a:r>
+              <a:rPr lang="en-US" b="0" i="0" dirty="0">
+                <a:effectLst/>
+                <a:latin typeface="-apple-system"/>
+              </a:rPr>
+              <a:t>ood restaurants availability, public transport availability, physical activeness, and general public’s age group in the 50 states of United States of America.</a:t>
+            </a:r>
+          </a:p>
+          <a:p>
+            <a:r>
+              <a:rPr lang="en-US" dirty="0">
+                <a:latin typeface="-apple-system"/>
+              </a:rPr>
+              <a:t>Why?</a:t>
+            </a:r>
+          </a:p>
+          <a:p>
+            <a:pPr lvl="1"/>
+            <a:r>
+              <a:rPr lang="en-US" b="0" i="0" dirty="0">
+                <a:effectLst/>
+                <a:latin typeface="-apple-system"/>
+              </a:rPr>
+              <a:t>Obesity is serious because it is associated with poorer mental health outcomes and reduced quality of life. Obesity is also associated with the leading causes of death in the United States and worldwide, including diabetes, heart disease, stroke, and some types of cancer.</a:t>
+            </a:r>
+          </a:p>
+          <a:p>
+            <a:pPr marL="457200" lvl="1" indent="0">
+              <a:buNone/>
+            </a:pPr>
+            <a:endParaRPr lang="en-US" b="0" i="0" dirty="0">
+              <a:effectLst/>
+              <a:latin typeface="-apple-system"/>
+            </a:endParaRPr>
+          </a:p>
+        </p:txBody>
+      </p:sp>
+    </p:spTree>
+    <p:extLst>
+      <p:ext uri="{BB962C8B-B14F-4D97-AF65-F5344CB8AC3E}">
+        <p14:creationId xmlns:p14="http://schemas.microsoft.com/office/powerpoint/2010/main" val="2307991246"/>
+      </p:ext>
+    </p:extLst>
+  </p:cSld>
+  <p:clrMapOvr>
+    <a:masterClrMapping/>
+  </p:clrMapOvr>
+</p:sld>
+</file>
+
+<file path=ppt/slides/slide20.xml><?xml version="1.0" encoding="utf-8"?>
 <p:sld xmlns:a="http://schemas.openxmlformats.org/drawingml/2006/main" xmlns:r="http://schemas.openxmlformats.org/officeDocument/2006/relationships" xmlns:p="http://schemas.openxmlformats.org/presentationml/2006/main">
   <p:cSld>
     <p:spTree>
@@ -16661,217 +17207,7 @@
 </p:sld>
 </file>
 
-<file path=ppt/slides/slide2.xml><?xml version="1.0" encoding="utf-8"?>
-<p:sld xmlns:a="http://schemas.openxmlformats.org/drawingml/2006/main" xmlns:r="http://schemas.openxmlformats.org/officeDocument/2006/relationships" xmlns:p="http://schemas.openxmlformats.org/presentationml/2006/main">
-  <p:cSld>
-    <p:spTree>
-      <p:nvGrpSpPr>
-        <p:cNvPr id="1" name=""/>
-        <p:cNvGrpSpPr/>
-        <p:nvPr/>
-      </p:nvGrpSpPr>
-      <p:grpSpPr>
-        <a:xfrm>
-          <a:off x="0" y="0"/>
-          <a:ext cx="0" cy="0"/>
-          <a:chOff x="0" y="0"/>
-          <a:chExt cx="0" cy="0"/>
-        </a:xfrm>
-      </p:grpSpPr>
-      <p:sp>
-        <p:nvSpPr>
-          <p:cNvPr id="2" name="Title 1">
-            <a:extLst>
-              <a:ext uri="{FF2B5EF4-FFF2-40B4-BE49-F238E27FC236}">
-                <a16:creationId xmlns:a16="http://schemas.microsoft.com/office/drawing/2014/main" id="{300302DA-AA85-4034-A477-2AC1F3C590D9}"/>
-              </a:ext>
-            </a:extLst>
-          </p:cNvPr>
-          <p:cNvSpPr>
-            <a:spLocks noGrp="1"/>
-          </p:cNvSpPr>
-          <p:nvPr>
-            <p:ph type="title"/>
-          </p:nvPr>
-        </p:nvSpPr>
-        <p:spPr/>
-        <p:txBody>
-          <a:bodyPr/>
-          <a:lstStyle/>
-          <a:p>
-            <a:r>
-              <a:rPr lang="en-AU" dirty="0"/>
-              <a:t>Scope of Data and Research	</a:t>
-            </a:r>
-          </a:p>
-        </p:txBody>
-      </p:sp>
-      <p:sp>
-        <p:nvSpPr>
-          <p:cNvPr id="3" name="Content Placeholder 2">
-            <a:extLst>
-              <a:ext uri="{FF2B5EF4-FFF2-40B4-BE49-F238E27FC236}">
-                <a16:creationId xmlns:a16="http://schemas.microsoft.com/office/drawing/2014/main" id="{FE0357A7-AD6C-458A-90D4-44ECF05458B4}"/>
-              </a:ext>
-            </a:extLst>
-          </p:cNvPr>
-          <p:cNvSpPr>
-            <a:spLocks noGrp="1"/>
-          </p:cNvSpPr>
-          <p:nvPr>
-            <p:ph idx="1"/>
-          </p:nvPr>
-        </p:nvSpPr>
-        <p:spPr/>
-        <p:txBody>
-          <a:bodyPr>
-            <a:normAutofit fontScale="85000" lnSpcReduction="10000"/>
-          </a:bodyPr>
-          <a:lstStyle/>
-          <a:p>
-            <a:pPr algn="l">
-              <a:buFont typeface="Arial" panose="020B0604020202020204" pitchFamily="34" charset="0"/>
-              <a:buChar char="•"/>
-            </a:pPr>
-            <a:r>
-              <a:rPr lang="en-US" b="0" i="0" dirty="0">
-                <a:effectLst/>
-                <a:latin typeface="-apple-system"/>
-              </a:rPr>
-              <a:t>Dataset Time to be 2019</a:t>
-            </a:r>
-          </a:p>
-          <a:p>
-            <a:pPr algn="l">
-              <a:buFont typeface="Arial" panose="020B0604020202020204" pitchFamily="34" charset="0"/>
-              <a:buChar char="•"/>
-            </a:pPr>
-            <a:r>
-              <a:rPr lang="en-US" b="0" i="0" dirty="0">
-                <a:effectLst/>
-                <a:latin typeface="-apple-system"/>
-              </a:rPr>
-              <a:t>All analysis and data to contain data of all the 50 states in USA, not including Federal District (District of Columbia) and Territories (American Samoa, Guam, Northern Mariana Islands, Puerto Rico, US Virgin Islands)</a:t>
-            </a:r>
-          </a:p>
-          <a:p>
-            <a:pPr algn="l">
-              <a:buFont typeface="Arial" panose="020B0604020202020204" pitchFamily="34" charset="0"/>
-              <a:buChar char="•"/>
-            </a:pPr>
-            <a:r>
-              <a:rPr lang="en-US" b="0" i="0" dirty="0">
-                <a:effectLst/>
-                <a:latin typeface="-apple-system"/>
-              </a:rPr>
-              <a:t>Average of Walkable distance - Public transport (Get total for each state)</a:t>
-            </a:r>
-          </a:p>
-          <a:p>
-            <a:pPr algn="l">
-              <a:buFont typeface="Arial" panose="020B0604020202020204" pitchFamily="34" charset="0"/>
-              <a:buChar char="•"/>
-            </a:pPr>
-            <a:r>
-              <a:rPr lang="en-US" b="0" i="0" dirty="0">
-                <a:effectLst/>
-                <a:latin typeface="-apple-system"/>
-              </a:rPr>
-              <a:t>Fast food -Include all restaurants in Number of restaurants per state (Heat Map number of Restaurant vs Obesity)</a:t>
-            </a:r>
-            <a:br>
-              <a:rPr lang="en-US" b="0" i="0" dirty="0">
-                <a:effectLst/>
-                <a:latin typeface="-apple-system"/>
-              </a:rPr>
-            </a:br>
-            <a:r>
-              <a:rPr lang="en-US" b="0" i="0" dirty="0">
-                <a:effectLst/>
-                <a:latin typeface="-apple-system"/>
-              </a:rPr>
-              <a:t>Top 5 Fast-food restaurants according to </a:t>
-            </a:r>
-            <a:r>
-              <a:rPr lang="en-US" b="0" i="0" u="none" strike="noStrike" dirty="0" err="1">
-                <a:effectLst/>
-                <a:latin typeface="-apple-system"/>
-                <a:hlinkClick r:id="rId2">
-                  <a:extLst>
-                    <a:ext uri="{A12FA001-AC4F-418D-AE19-62706E023703}">
-                      <ahyp:hlinkClr xmlns:ahyp="http://schemas.microsoft.com/office/drawing/2018/hyperlinkcolor" val="tx"/>
-                    </a:ext>
-                  </a:extLst>
-                </a:hlinkClick>
-              </a:rPr>
-              <a:t>Eatthis</a:t>
-            </a:r>
-            <a:r>
-              <a:rPr lang="en-US" b="0" i="0" dirty="0">
-                <a:effectLst/>
-                <a:latin typeface="-apple-system"/>
-              </a:rPr>
-              <a:t>- McDonald's, Starbucks, Chick-fil-A, Taco Bell, Burger King</a:t>
-            </a:r>
-            <a:br>
-              <a:rPr lang="en-US" b="0" i="0" dirty="0">
-                <a:effectLst/>
-                <a:latin typeface="-apple-system"/>
-              </a:rPr>
-            </a:br>
-            <a:r>
-              <a:rPr lang="en-US" b="0" i="0" dirty="0">
-                <a:effectLst/>
-                <a:latin typeface="-apple-system"/>
-              </a:rPr>
-              <a:t>Count restaurants for each states, use the dot size as the heat map.</a:t>
-            </a:r>
-          </a:p>
-          <a:p>
-            <a:pPr algn="l">
-              <a:buFont typeface="Arial" panose="020B0604020202020204" pitchFamily="34" charset="0"/>
-              <a:buChar char="•"/>
-            </a:pPr>
-            <a:r>
-              <a:rPr lang="en-US" b="0" i="0" dirty="0">
-                <a:effectLst/>
-                <a:latin typeface="-apple-system"/>
-              </a:rPr>
-              <a:t>Age group - Children and Teens (Ages 2 - 19 years) Adults - 20 Over</a:t>
-            </a:r>
-          </a:p>
-          <a:p>
-            <a:pPr algn="l">
-              <a:buFont typeface="Arial" panose="020B0604020202020204" pitchFamily="34" charset="0"/>
-              <a:buChar char="•"/>
-            </a:pPr>
-            <a:r>
-              <a:rPr lang="en-US" b="0" i="0" dirty="0">
-                <a:effectLst/>
-                <a:latin typeface="-apple-system"/>
-              </a:rPr>
-              <a:t>Physical activity facilities to focus on Gyms, Physical activeness (Meeting CDC requirements -Achieving at least 150 minutes a week of moderate-intensity aerobic physical activity or 75 minutes a week of vigorous-intensity aerobic physical activity and engage in muscle-strengthening activities on 2 or more days a week)</a:t>
-            </a:r>
-          </a:p>
-          <a:p>
-            <a:endParaRPr lang="en-AU" dirty="0"/>
-          </a:p>
-        </p:txBody>
-      </p:sp>
-    </p:spTree>
-    <p:extLst>
-      <p:ext uri="{BB962C8B-B14F-4D97-AF65-F5344CB8AC3E}">
-        <p14:creationId xmlns:p14="http://schemas.microsoft.com/office/powerpoint/2010/main" val="3524196571"/>
-      </p:ext>
-    </p:extLst>
-  </p:cSld>
-  <p:clrMapOvr>
-    <a:masterClrMapping/>
-  </p:clrMapOvr>
-</p:sld>
-</file>
-
-<file path=ppt/slides/slide20.xml><?xml version="1.0" encoding="utf-8"?>
+<file path=ppt/slides/slide21.xml><?xml version="1.0" encoding="utf-8"?>
 <p:sld xmlns:a="http://schemas.openxmlformats.org/drawingml/2006/main" xmlns:r="http://schemas.openxmlformats.org/officeDocument/2006/relationships" xmlns:p="http://schemas.openxmlformats.org/presentationml/2006/main">
   <p:cSld>
     <p:spTree>
@@ -16978,7 +17314,7 @@
 </p:sld>
 </file>
 
-<file path=ppt/slides/slide21.xml><?xml version="1.0" encoding="utf-8"?>
+<file path=ppt/slides/slide22.xml><?xml version="1.0" encoding="utf-8"?>
 <p:sld xmlns:a="http://schemas.openxmlformats.org/drawingml/2006/main" xmlns:r="http://schemas.openxmlformats.org/officeDocument/2006/relationships" xmlns:p="http://schemas.openxmlformats.org/presentationml/2006/main">
   <p:cSld>
     <p:spTree>
@@ -17088,7 +17424,7 @@
 </p:sld>
 </file>
 
-<file path=ppt/slides/slide22.xml><?xml version="1.0" encoding="utf-8"?>
+<file path=ppt/slides/slide23.xml><?xml version="1.0" encoding="utf-8"?>
 <p:sld xmlns:a="http://schemas.openxmlformats.org/drawingml/2006/main" xmlns:r="http://schemas.openxmlformats.org/officeDocument/2006/relationships" xmlns:p="http://schemas.openxmlformats.org/presentationml/2006/main">
   <p:cSld>
     <p:bg>
@@ -18047,6 +18383,216 @@
           <p:cNvPr id="2" name="Title 1">
             <a:extLst>
               <a:ext uri="{FF2B5EF4-FFF2-40B4-BE49-F238E27FC236}">
+                <a16:creationId xmlns:a16="http://schemas.microsoft.com/office/drawing/2014/main" id="{300302DA-AA85-4034-A477-2AC1F3C590D9}"/>
+              </a:ext>
+            </a:extLst>
+          </p:cNvPr>
+          <p:cNvSpPr>
+            <a:spLocks noGrp="1"/>
+          </p:cNvSpPr>
+          <p:nvPr>
+            <p:ph type="title"/>
+          </p:nvPr>
+        </p:nvSpPr>
+        <p:spPr/>
+        <p:txBody>
+          <a:bodyPr/>
+          <a:lstStyle/>
+          <a:p>
+            <a:r>
+              <a:rPr lang="en-AU" dirty="0"/>
+              <a:t>Scope of Data and Research	</a:t>
+            </a:r>
+          </a:p>
+        </p:txBody>
+      </p:sp>
+      <p:sp>
+        <p:nvSpPr>
+          <p:cNvPr id="3" name="Content Placeholder 2">
+            <a:extLst>
+              <a:ext uri="{FF2B5EF4-FFF2-40B4-BE49-F238E27FC236}">
+                <a16:creationId xmlns:a16="http://schemas.microsoft.com/office/drawing/2014/main" id="{FE0357A7-AD6C-458A-90D4-44ECF05458B4}"/>
+              </a:ext>
+            </a:extLst>
+          </p:cNvPr>
+          <p:cNvSpPr>
+            <a:spLocks noGrp="1"/>
+          </p:cNvSpPr>
+          <p:nvPr>
+            <p:ph idx="1"/>
+          </p:nvPr>
+        </p:nvSpPr>
+        <p:spPr/>
+        <p:txBody>
+          <a:bodyPr>
+            <a:normAutofit fontScale="85000" lnSpcReduction="10000"/>
+          </a:bodyPr>
+          <a:lstStyle/>
+          <a:p>
+            <a:pPr algn="l">
+              <a:buFont typeface="Arial" panose="020B0604020202020204" pitchFamily="34" charset="0"/>
+              <a:buChar char="•"/>
+            </a:pPr>
+            <a:r>
+              <a:rPr lang="en-US" b="0" i="0" dirty="0">
+                <a:effectLst/>
+                <a:latin typeface="-apple-system"/>
+              </a:rPr>
+              <a:t>Dataset Time to be 2019</a:t>
+            </a:r>
+          </a:p>
+          <a:p>
+            <a:pPr algn="l">
+              <a:buFont typeface="Arial" panose="020B0604020202020204" pitchFamily="34" charset="0"/>
+              <a:buChar char="•"/>
+            </a:pPr>
+            <a:r>
+              <a:rPr lang="en-US" b="0" i="0" dirty="0">
+                <a:effectLst/>
+                <a:latin typeface="-apple-system"/>
+              </a:rPr>
+              <a:t>All analysis and data to contain data of all the 50 states in USA, not including Federal District (District of Columbia) and Territories (American Samoa, Guam, Northern Mariana Islands, Puerto Rico, US Virgin Islands)</a:t>
+            </a:r>
+          </a:p>
+          <a:p>
+            <a:pPr algn="l">
+              <a:buFont typeface="Arial" panose="020B0604020202020204" pitchFamily="34" charset="0"/>
+              <a:buChar char="•"/>
+            </a:pPr>
+            <a:r>
+              <a:rPr lang="en-US" b="0" i="0" dirty="0">
+                <a:effectLst/>
+                <a:latin typeface="-apple-system"/>
+              </a:rPr>
+              <a:t>Average of Walkable distance - Public transport (Get total for each state)</a:t>
+            </a:r>
+          </a:p>
+          <a:p>
+            <a:pPr algn="l">
+              <a:buFont typeface="Arial" panose="020B0604020202020204" pitchFamily="34" charset="0"/>
+              <a:buChar char="•"/>
+            </a:pPr>
+            <a:r>
+              <a:rPr lang="en-US" b="0" i="0" dirty="0">
+                <a:effectLst/>
+                <a:latin typeface="-apple-system"/>
+              </a:rPr>
+              <a:t>Fast food -Include all restaurants in Number of restaurants per state (Heat Map number of Restaurant vs Obesity)</a:t>
+            </a:r>
+            <a:br>
+              <a:rPr lang="en-US" b="0" i="0" dirty="0">
+                <a:effectLst/>
+                <a:latin typeface="-apple-system"/>
+              </a:rPr>
+            </a:br>
+            <a:r>
+              <a:rPr lang="en-US" b="0" i="0" dirty="0">
+                <a:effectLst/>
+                <a:latin typeface="-apple-system"/>
+              </a:rPr>
+              <a:t>Top 5 Fast-food restaurants according to </a:t>
+            </a:r>
+            <a:r>
+              <a:rPr lang="en-US" b="0" i="0" u="none" strike="noStrike" dirty="0" err="1">
+                <a:effectLst/>
+                <a:latin typeface="-apple-system"/>
+                <a:hlinkClick r:id="rId2">
+                  <a:extLst>
+                    <a:ext uri="{A12FA001-AC4F-418D-AE19-62706E023703}">
+                      <ahyp:hlinkClr xmlns:ahyp="http://schemas.microsoft.com/office/drawing/2018/hyperlinkcolor" val="tx"/>
+                    </a:ext>
+                  </a:extLst>
+                </a:hlinkClick>
+              </a:rPr>
+              <a:t>Eatthis</a:t>
+            </a:r>
+            <a:r>
+              <a:rPr lang="en-US" b="0" i="0" dirty="0">
+                <a:effectLst/>
+                <a:latin typeface="-apple-system"/>
+              </a:rPr>
+              <a:t>- McDonald's, Starbucks, Chick-fil-A, Taco Bell, Burger King</a:t>
+            </a:r>
+            <a:br>
+              <a:rPr lang="en-US" b="0" i="0" dirty="0">
+                <a:effectLst/>
+                <a:latin typeface="-apple-system"/>
+              </a:rPr>
+            </a:br>
+            <a:r>
+              <a:rPr lang="en-US" b="0" i="0" dirty="0">
+                <a:effectLst/>
+                <a:latin typeface="-apple-system"/>
+              </a:rPr>
+              <a:t>Count restaurants for each states, use the dot size as the heat map.</a:t>
+            </a:r>
+          </a:p>
+          <a:p>
+            <a:pPr algn="l">
+              <a:buFont typeface="Arial" panose="020B0604020202020204" pitchFamily="34" charset="0"/>
+              <a:buChar char="•"/>
+            </a:pPr>
+            <a:r>
+              <a:rPr lang="en-US" b="0" i="0" dirty="0">
+                <a:effectLst/>
+                <a:latin typeface="-apple-system"/>
+              </a:rPr>
+              <a:t>Age group - Children and Teens (Ages 2 - 19 years) Adults - 20 Over</a:t>
+            </a:r>
+          </a:p>
+          <a:p>
+            <a:pPr algn="l">
+              <a:buFont typeface="Arial" panose="020B0604020202020204" pitchFamily="34" charset="0"/>
+              <a:buChar char="•"/>
+            </a:pPr>
+            <a:r>
+              <a:rPr lang="en-US" b="0" i="0" dirty="0">
+                <a:effectLst/>
+                <a:latin typeface="-apple-system"/>
+              </a:rPr>
+              <a:t>Physical activity facilities to focus on Gyms, Physical activeness (Meeting CDC requirements -Achieving at least 150 minutes a week of moderate-intensity aerobic physical activity or 75 minutes a week of vigorous-intensity aerobic physical activity and engage in muscle-strengthening activities on 2 or more days a week)</a:t>
+            </a:r>
+          </a:p>
+          <a:p>
+            <a:endParaRPr lang="en-AU" dirty="0"/>
+          </a:p>
+        </p:txBody>
+      </p:sp>
+    </p:spTree>
+    <p:extLst>
+      <p:ext uri="{BB962C8B-B14F-4D97-AF65-F5344CB8AC3E}">
+        <p14:creationId xmlns:p14="http://schemas.microsoft.com/office/powerpoint/2010/main" val="3524196571"/>
+      </p:ext>
+    </p:extLst>
+  </p:cSld>
+  <p:clrMapOvr>
+    <a:masterClrMapping/>
+  </p:clrMapOvr>
+</p:sld>
+</file>
+
+<file path=ppt/slides/slide4.xml><?xml version="1.0" encoding="utf-8"?>
+<p:sld xmlns:a="http://schemas.openxmlformats.org/drawingml/2006/main" xmlns:r="http://schemas.openxmlformats.org/officeDocument/2006/relationships" xmlns:p="http://schemas.openxmlformats.org/presentationml/2006/main">
+  <p:cSld>
+    <p:spTree>
+      <p:nvGrpSpPr>
+        <p:cNvPr id="1" name=""/>
+        <p:cNvGrpSpPr/>
+        <p:nvPr/>
+      </p:nvGrpSpPr>
+      <p:grpSpPr>
+        <a:xfrm>
+          <a:off x="0" y="0"/>
+          <a:ext cx="0" cy="0"/>
+          <a:chOff x="0" y="0"/>
+          <a:chExt cx="0" cy="0"/>
+        </a:xfrm>
+      </p:grpSpPr>
+      <p:sp>
+        <p:nvSpPr>
+          <p:cNvPr id="2" name="Title 1">
+            <a:extLst>
+              <a:ext uri="{FF2B5EF4-FFF2-40B4-BE49-F238E27FC236}">
                 <a16:creationId xmlns:a16="http://schemas.microsoft.com/office/drawing/2014/main" id="{91931067-67F3-411A-971C-3BE3252E56BB}"/>
               </a:ext>
             </a:extLst>
@@ -18089,7 +18635,7 @@
         <p:spPr/>
         <p:txBody>
           <a:bodyPr>
-            <a:normAutofit/>
+            <a:noAutofit/>
           </a:bodyPr>
           <a:lstStyle/>
           <a:p>
@@ -18098,7 +18644,10 @@
               <a:buAutoNum type="arabicPeriod"/>
             </a:pPr>
             <a:r>
-              <a:rPr lang="en-US" b="0" i="0" dirty="0">
+              <a:rPr lang="en-US" sz="2000" b="0" i="0" dirty="0">
+                <a:solidFill>
+                  <a:schemeClr val="tx1"/>
+                </a:solidFill>
                 <a:effectLst/>
                 <a:latin typeface="-apple-system"/>
               </a:rPr>
@@ -18111,11 +18660,14 @@
               <a:buAutoNum type="arabicPeriod"/>
             </a:pPr>
             <a:r>
-              <a:rPr lang="en-US" b="0" i="0" dirty="0">
+              <a:rPr lang="en-US" sz="2000" b="0" i="0" dirty="0">
+                <a:solidFill>
+                  <a:schemeClr val="tx1"/>
+                </a:solidFill>
                 <a:effectLst/>
                 <a:latin typeface="-apple-system"/>
               </a:rPr>
-              <a:t>The more 'Top 5' fast food restaurants in a states, the higher the obesity rate</a:t>
+              <a:t>The higher the population, the more the Fast food restaurants, hence higher the obesity rate</a:t>
             </a:r>
           </a:p>
           <a:p>
@@ -18124,11 +18676,14 @@
               <a:buAutoNum type="arabicPeriod"/>
             </a:pPr>
             <a:r>
-              <a:rPr lang="en-US" b="0" i="0" dirty="0">
+              <a:rPr lang="en-US" sz="2000" b="0" i="0" dirty="0">
+                <a:solidFill>
+                  <a:schemeClr val="tx1"/>
+                </a:solidFill>
                 <a:effectLst/>
                 <a:latin typeface="-apple-system"/>
               </a:rPr>
-              <a:t>The more walkable distance to anywhere, the lower the obesity rate</a:t>
+              <a:t>Is there any relation between mode of commute and obesity?</a:t>
             </a:r>
           </a:p>
           <a:p>
@@ -18137,11 +18692,14 @@
               <a:buAutoNum type="arabicPeriod"/>
             </a:pPr>
             <a:r>
-              <a:rPr lang="en-US" b="0" i="0" dirty="0">
+              <a:rPr lang="en-US" sz="2000" b="0" i="0" dirty="0">
+                <a:solidFill>
+                  <a:schemeClr val="tx1"/>
+                </a:solidFill>
                 <a:effectLst/>
                 <a:latin typeface="-apple-system"/>
               </a:rPr>
-              <a:t>How many are walking for their day-to-day need? (Location of supermarket, bus stops)</a:t>
+              <a:t>How many are walking for their day-to-day need?</a:t>
             </a:r>
           </a:p>
           <a:p>
@@ -18150,7 +18708,10 @@
               <a:buAutoNum type="arabicPeriod"/>
             </a:pPr>
             <a:r>
-              <a:rPr lang="en-US" b="0" i="0" dirty="0">
+              <a:rPr lang="en-US" sz="2000" b="0" i="0" dirty="0">
+                <a:solidFill>
+                  <a:schemeClr val="tx1"/>
+                </a:solidFill>
                 <a:effectLst/>
                 <a:latin typeface="-apple-system"/>
               </a:rPr>
@@ -18163,7 +18724,10 @@
               <a:buAutoNum type="arabicPeriod"/>
             </a:pPr>
             <a:r>
-              <a:rPr lang="en-US" b="0" i="0" dirty="0">
+              <a:rPr lang="en-US" sz="2000" b="0" i="0" dirty="0">
+                <a:solidFill>
+                  <a:schemeClr val="tx1"/>
+                </a:solidFill>
                 <a:effectLst/>
                 <a:latin typeface="-apple-system"/>
               </a:rPr>
@@ -18176,11 +18740,14 @@
               <a:buAutoNum type="arabicPeriod"/>
             </a:pPr>
             <a:r>
-              <a:rPr lang="en-US" b="0" i="0" dirty="0">
+              <a:rPr lang="en-US" sz="2000" b="0" i="0" dirty="0">
+                <a:solidFill>
+                  <a:schemeClr val="tx1"/>
+                </a:solidFill>
                 <a:effectLst/>
                 <a:latin typeface="-apple-system"/>
               </a:rPr>
-              <a:t>Younger generation that tends to prefer fast food would be more obese</a:t>
+              <a:t>Older generation tend to have higher rate of obesity than younger generation</a:t>
             </a:r>
           </a:p>
           <a:p>
@@ -18189,15 +18756,15 @@
               <a:buAutoNum type="arabicPeriod"/>
             </a:pPr>
             <a:r>
-              <a:rPr lang="en-US" b="0" i="0" dirty="0">
+              <a:rPr lang="en-US" sz="2000" b="0" i="0" dirty="0">
+                <a:solidFill>
+                  <a:schemeClr val="tx1"/>
+                </a:solidFill>
                 <a:effectLst/>
                 <a:latin typeface="-apple-system"/>
               </a:rPr>
-              <a:t>Older generation that are more immobile tend to be more obese</a:t>
-            </a:r>
-          </a:p>
-          <a:p>
-            <a:endParaRPr lang="en-AU" dirty="0"/>
+              <a:t>The higher income, the lower obesity rate</a:t>
+            </a:r>
           </a:p>
         </p:txBody>
       </p:sp>
@@ -18214,7 +18781,7 @@
 </p:sld>
 </file>
 
-<file path=ppt/slides/slide4.xml><?xml version="1.0" encoding="utf-8"?>
+<file path=ppt/slides/slide5.xml><?xml version="1.0" encoding="utf-8"?>
 <p:sld xmlns:a="http://schemas.openxmlformats.org/drawingml/2006/main" xmlns:r="http://schemas.openxmlformats.org/officeDocument/2006/relationships" xmlns:p="http://schemas.openxmlformats.org/presentationml/2006/main">
   <p:cSld>
     <p:spTree>
@@ -18321,7 +18888,7 @@
 </p:sld>
 </file>
 
-<file path=ppt/slides/slide5.xml><?xml version="1.0" encoding="utf-8"?>
+<file path=ppt/slides/slide6.xml><?xml version="1.0" encoding="utf-8"?>
 <p:sld xmlns:a="http://schemas.openxmlformats.org/drawingml/2006/main" xmlns:r="http://schemas.openxmlformats.org/officeDocument/2006/relationships" xmlns:p="http://schemas.openxmlformats.org/presentationml/2006/main">
   <p:cSld>
     <p:spTree>
@@ -18424,7 +18991,7 @@
 </p:sld>
 </file>
 
-<file path=ppt/slides/slide6.xml><?xml version="1.0" encoding="utf-8"?>
+<file path=ppt/slides/slide7.xml><?xml version="1.0" encoding="utf-8"?>
 <p:sld xmlns:a="http://schemas.openxmlformats.org/drawingml/2006/main" xmlns:r="http://schemas.openxmlformats.org/officeDocument/2006/relationships" xmlns:p="http://schemas.openxmlformats.org/presentationml/2006/main">
   <p:cSld>
     <p:spTree>
@@ -18551,7 +19118,7 @@
 </p:sld>
 </file>
 
-<file path=ppt/slides/slide7.xml><?xml version="1.0" encoding="utf-8"?>
+<file path=ppt/slides/slide8.xml><?xml version="1.0" encoding="utf-8"?>
 <p:sld xmlns:a="http://schemas.openxmlformats.org/drawingml/2006/main" xmlns:r="http://schemas.openxmlformats.org/officeDocument/2006/relationships" xmlns:p="http://schemas.openxmlformats.org/presentationml/2006/main">
   <p:cSld>
     <p:spTree>
@@ -18800,7 +19367,7 @@
 </p:sld>
 </file>
 
-<file path=ppt/slides/slide8.xml><?xml version="1.0" encoding="utf-8"?>
+<file path=ppt/slides/slide9.xml><?xml version="1.0" encoding="utf-8"?>
 <p:sld xmlns:a="http://schemas.openxmlformats.org/drawingml/2006/main" xmlns:r="http://schemas.openxmlformats.org/officeDocument/2006/relationships" xmlns:p="http://schemas.openxmlformats.org/presentationml/2006/main">
   <p:cSld>
     <p:spTree>
@@ -19244,453 +19811,6 @@
     <p:extLst>
       <p:ext uri="{BB962C8B-B14F-4D97-AF65-F5344CB8AC3E}">
         <p14:creationId xmlns:p14="http://schemas.microsoft.com/office/powerpoint/2010/main" val="2399947885"/>
-      </p:ext>
-    </p:extLst>
-  </p:cSld>
-  <p:clrMapOvr>
-    <a:masterClrMapping/>
-  </p:clrMapOvr>
-</p:sld>
-</file>
-
-<file path=ppt/slides/slide9.xml><?xml version="1.0" encoding="utf-8"?>
-<p:sld xmlns:a="http://schemas.openxmlformats.org/drawingml/2006/main" xmlns:r="http://schemas.openxmlformats.org/officeDocument/2006/relationships" xmlns:p="http://schemas.openxmlformats.org/presentationml/2006/main">
-  <p:cSld>
-    <p:spTree>
-      <p:nvGrpSpPr>
-        <p:cNvPr id="1" name=""/>
-        <p:cNvGrpSpPr/>
-        <p:nvPr/>
-      </p:nvGrpSpPr>
-      <p:grpSpPr>
-        <a:xfrm>
-          <a:off x="0" y="0"/>
-          <a:ext cx="0" cy="0"/>
-          <a:chOff x="0" y="0"/>
-          <a:chExt cx="0" cy="0"/>
-        </a:xfrm>
-      </p:grpSpPr>
-      <p:sp>
-        <p:nvSpPr>
-          <p:cNvPr id="2" name="Title 1">
-            <a:extLst>
-              <a:ext uri="{FF2B5EF4-FFF2-40B4-BE49-F238E27FC236}">
-                <a16:creationId xmlns:a16="http://schemas.microsoft.com/office/drawing/2014/main" id="{65395B54-E758-4630-AA1F-47AC01C17D3B}"/>
-              </a:ext>
-            </a:extLst>
-          </p:cNvPr>
-          <p:cNvSpPr>
-            <a:spLocks noGrp="1"/>
-          </p:cNvSpPr>
-          <p:nvPr>
-            <p:ph type="title"/>
-          </p:nvPr>
-        </p:nvSpPr>
-        <p:spPr/>
-        <p:txBody>
-          <a:bodyPr/>
-          <a:lstStyle/>
-          <a:p>
-            <a:r>
-              <a:rPr lang="en-AU" dirty="0"/>
-              <a:t>RELATIONSHIP (POPULATION VS FAST FOOD RESTAURANTS)</a:t>
-            </a:r>
-          </a:p>
-        </p:txBody>
-      </p:sp>
-      <p:sp>
-        <p:nvSpPr>
-          <p:cNvPr id="9" name="Rectangle 1">
-            <a:extLst>
-              <a:ext uri="{FF2B5EF4-FFF2-40B4-BE49-F238E27FC236}">
-                <a16:creationId xmlns:a16="http://schemas.microsoft.com/office/drawing/2014/main" id="{AAF0AD85-B5C3-4760-BA51-3272B5BF7C30}"/>
-              </a:ext>
-            </a:extLst>
-          </p:cNvPr>
-          <p:cNvSpPr>
-            <a:spLocks noChangeArrowheads="1"/>
-          </p:cNvSpPr>
-          <p:nvPr/>
-        </p:nvSpPr>
-        <p:spPr bwMode="auto">
-          <a:xfrm>
-            <a:off x="0" y="0"/>
-            <a:ext cx="12192000" cy="457200"/>
-          </a:xfrm>
-          <a:prstGeom prst="rect">
-            <a:avLst/>
-          </a:prstGeom>
-          <a:solidFill>
-            <a:srgbClr val="FFFFFF"/>
-          </a:solidFill>
-          <a:ln>
-            <a:noFill/>
-          </a:ln>
-          <a:effectLst/>
-          <a:extLst>
-            <a:ext uri="{91240B29-F687-4F45-9708-019B960494DF}">
-              <a14:hiddenLine xmlns:a14="http://schemas.microsoft.com/office/drawing/2010/main" w="9525">
-                <a:solidFill>
-                  <a:schemeClr val="tx1"/>
-                </a:solidFill>
-                <a:miter lim="800000"/>
-                <a:headEnd/>
-                <a:tailEnd/>
-              </a14:hiddenLine>
-            </a:ext>
-            <a:ext uri="{AF507438-7753-43E0-B8FC-AC1667EBCBE1}">
-              <a14:hiddenEffects xmlns:a14="http://schemas.microsoft.com/office/drawing/2010/main">
-                <a:effectLst>
-                  <a:outerShdw dist="35921" dir="2700000" algn="ctr" rotWithShape="0">
-                    <a:schemeClr val="bg2"/>
-                  </a:outerShdw>
-                </a:effectLst>
-              </a14:hiddenEffects>
-            </a:ext>
-          </a:extLst>
-        </p:spPr>
-        <p:txBody>
-          <a:bodyPr vert="horz" wrap="none" lIns="0" tIns="0" rIns="0" bIns="0" numCol="1" anchor="ctr" anchorCtr="0" compatLnSpc="1">
-            <a:prstTxWarp prst="textNoShape">
-              <a:avLst/>
-            </a:prstTxWarp>
-            <a:spAutoFit/>
-          </a:bodyPr>
-          <a:lstStyle/>
-          <a:p>
-            <a:pPr marL="0" marR="0" lvl="0" indent="0" algn="l" defTabSz="914400" rtl="0" eaLnBrk="0" fontAlgn="base" latinLnBrk="0" hangingPunct="0">
-              <a:lnSpc>
-                <a:spcPct val="100000"/>
-              </a:lnSpc>
-              <a:spcBef>
-                <a:spcPct val="0"/>
-              </a:spcBef>
-              <a:spcAft>
-                <a:spcPct val="0"/>
-              </a:spcAft>
-              <a:buClrTx/>
-              <a:buSzTx/>
-              <a:buFontTx/>
-              <a:buNone/>
-              <a:tabLst/>
-            </a:pPr>
-            <a:r>
-              <a:rPr kumimoji="0" lang="en-US" altLang="en-US" sz="1000" b="0" i="0" u="none" strike="noStrike" cap="none" normalizeH="0" baseline="0">
-                <a:ln>
-                  <a:noFill/>
-                </a:ln>
-                <a:solidFill>
-                  <a:srgbClr val="000000"/>
-                </a:solidFill>
-                <a:effectLst/>
-                <a:latin typeface="Courier New" panose="02070309020205020404" pitchFamily="49" charset="0"/>
-              </a:rPr>
-              <a:t>The correlation between both factors is 0.75</a:t>
-            </a:r>
-            <a:r>
-              <a:rPr kumimoji="0" lang="en-US" altLang="en-US" sz="800" b="0" i="0" u="none" strike="noStrike" cap="none" normalizeH="0" baseline="0">
-                <a:ln>
-                  <a:noFill/>
-                </a:ln>
-                <a:solidFill>
-                  <a:schemeClr val="tx1"/>
-                </a:solidFill>
-                <a:effectLst/>
-              </a:rPr>
-              <a:t> </a:t>
-            </a:r>
-            <a:endParaRPr kumimoji="0" lang="en-US" altLang="en-US" sz="1800" b="0" i="0" u="none" strike="noStrike" cap="none" normalizeH="0" baseline="0">
-              <a:ln>
-                <a:noFill/>
-              </a:ln>
-              <a:solidFill>
-                <a:schemeClr val="tx1"/>
-              </a:solidFill>
-              <a:effectLst/>
-              <a:latin typeface="Arial" panose="020B0604020202020204" pitchFamily="34" charset="0"/>
-            </a:endParaRPr>
-          </a:p>
-        </p:txBody>
-      </p:sp>
-      <p:sp>
-        <p:nvSpPr>
-          <p:cNvPr id="10" name="TextBox 9">
-            <a:extLst>
-              <a:ext uri="{FF2B5EF4-FFF2-40B4-BE49-F238E27FC236}">
-                <a16:creationId xmlns:a16="http://schemas.microsoft.com/office/drawing/2014/main" id="{BD99EE48-D14D-4ABC-96A1-64200ED7B86F}"/>
-              </a:ext>
-            </a:extLst>
-          </p:cNvPr>
-          <p:cNvSpPr txBox="1"/>
-          <p:nvPr/>
-        </p:nvSpPr>
-        <p:spPr>
-          <a:xfrm>
-            <a:off x="902812" y="6267450"/>
-            <a:ext cx="5067413" cy="369332"/>
-          </a:xfrm>
-          <a:prstGeom prst="rect">
-            <a:avLst/>
-          </a:prstGeom>
-          <a:noFill/>
-        </p:spPr>
-        <p:txBody>
-          <a:bodyPr wrap="none" rtlCol="0">
-            <a:spAutoFit/>
-          </a:bodyPr>
-          <a:lstStyle/>
-          <a:p>
-            <a:r>
-              <a:rPr lang="en-US" dirty="0"/>
-              <a:t>The correlation between both factors is 0.99</a:t>
-            </a:r>
-            <a:endParaRPr lang="en-AU" dirty="0"/>
-          </a:p>
-        </p:txBody>
-      </p:sp>
-      <p:sp>
-        <p:nvSpPr>
-          <p:cNvPr id="11" name="Rectangle 2">
-            <a:extLst>
-              <a:ext uri="{FF2B5EF4-FFF2-40B4-BE49-F238E27FC236}">
-                <a16:creationId xmlns:a16="http://schemas.microsoft.com/office/drawing/2014/main" id="{156E7540-53FE-476D-B803-F82DB68BFBF8}"/>
-              </a:ext>
-            </a:extLst>
-          </p:cNvPr>
-          <p:cNvSpPr>
-            <a:spLocks noChangeArrowheads="1"/>
-          </p:cNvSpPr>
-          <p:nvPr/>
-        </p:nvSpPr>
-        <p:spPr bwMode="auto">
-          <a:xfrm>
-            <a:off x="152400" y="152400"/>
-            <a:ext cx="12192000" cy="457200"/>
-          </a:xfrm>
-          <a:prstGeom prst="rect">
-            <a:avLst/>
-          </a:prstGeom>
-          <a:solidFill>
-            <a:srgbClr val="FFFFFF"/>
-          </a:solidFill>
-          <a:ln>
-            <a:noFill/>
-          </a:ln>
-          <a:effectLst/>
-          <a:extLst>
-            <a:ext uri="{91240B29-F687-4F45-9708-019B960494DF}">
-              <a14:hiddenLine xmlns:a14="http://schemas.microsoft.com/office/drawing/2010/main" w="9525">
-                <a:solidFill>
-                  <a:schemeClr val="tx1"/>
-                </a:solidFill>
-                <a:miter lim="800000"/>
-                <a:headEnd/>
-                <a:tailEnd/>
-              </a14:hiddenLine>
-            </a:ext>
-            <a:ext uri="{AF507438-7753-43E0-B8FC-AC1667EBCBE1}">
-              <a14:hiddenEffects xmlns:a14="http://schemas.microsoft.com/office/drawing/2010/main">
-                <a:effectLst>
-                  <a:outerShdw dist="35921" dir="2700000" algn="ctr" rotWithShape="0">
-                    <a:schemeClr val="bg2"/>
-                  </a:outerShdw>
-                </a:effectLst>
-              </a14:hiddenEffects>
-            </a:ext>
-          </a:extLst>
-        </p:spPr>
-        <p:txBody>
-          <a:bodyPr vert="horz" wrap="none" lIns="0" tIns="0" rIns="0" bIns="0" numCol="1" anchor="ctr" anchorCtr="0" compatLnSpc="1">
-            <a:prstTxWarp prst="textNoShape">
-              <a:avLst/>
-            </a:prstTxWarp>
-            <a:spAutoFit/>
-          </a:bodyPr>
-          <a:lstStyle/>
-          <a:p>
-            <a:pPr marL="0" marR="0" lvl="0" indent="0" algn="l" defTabSz="914400" rtl="0" eaLnBrk="0" fontAlgn="base" latinLnBrk="0" hangingPunct="0">
-              <a:lnSpc>
-                <a:spcPct val="100000"/>
-              </a:lnSpc>
-              <a:spcBef>
-                <a:spcPct val="0"/>
-              </a:spcBef>
-              <a:spcAft>
-                <a:spcPct val="0"/>
-              </a:spcAft>
-              <a:buClrTx/>
-              <a:buSzTx/>
-              <a:buFontTx/>
-              <a:buNone/>
-              <a:tabLst/>
-            </a:pPr>
-            <a:r>
-              <a:rPr kumimoji="0" lang="en-US" altLang="en-US" sz="1000" b="0" i="0" u="none" strike="noStrike" cap="none" normalizeH="0" baseline="0">
-                <a:ln>
-                  <a:noFill/>
-                </a:ln>
-                <a:solidFill>
-                  <a:srgbClr val="000000"/>
-                </a:solidFill>
-                <a:effectLst/>
-                <a:latin typeface="Courier New" panose="02070309020205020404" pitchFamily="49" charset="0"/>
-              </a:rPr>
-              <a:t>The correlation between both factors is 0.75</a:t>
-            </a:r>
-            <a:r>
-              <a:rPr kumimoji="0" lang="en-US" altLang="en-US" sz="800" b="0" i="0" u="none" strike="noStrike" cap="none" normalizeH="0" baseline="0">
-                <a:ln>
-                  <a:noFill/>
-                </a:ln>
-                <a:solidFill>
-                  <a:schemeClr val="tx1"/>
-                </a:solidFill>
-                <a:effectLst/>
-              </a:rPr>
-              <a:t> </a:t>
-            </a:r>
-            <a:endParaRPr kumimoji="0" lang="en-US" altLang="en-US" sz="1800" b="0" i="0" u="none" strike="noStrike" cap="none" normalizeH="0" baseline="0">
-              <a:ln>
-                <a:noFill/>
-              </a:ln>
-              <a:solidFill>
-                <a:schemeClr val="tx1"/>
-              </a:solidFill>
-              <a:effectLst/>
-              <a:latin typeface="Arial" panose="020B0604020202020204" pitchFamily="34" charset="0"/>
-            </a:endParaRPr>
-          </a:p>
-        </p:txBody>
-      </p:sp>
-      <p:sp>
-        <p:nvSpPr>
-          <p:cNvPr id="12" name="TextBox 11">
-            <a:extLst>
-              <a:ext uri="{FF2B5EF4-FFF2-40B4-BE49-F238E27FC236}">
-                <a16:creationId xmlns:a16="http://schemas.microsoft.com/office/drawing/2014/main" id="{EEB4A170-3B65-4376-9960-F38F59068B97}"/>
-              </a:ext>
-            </a:extLst>
-          </p:cNvPr>
-          <p:cNvSpPr txBox="1"/>
-          <p:nvPr/>
-        </p:nvSpPr>
-        <p:spPr>
-          <a:xfrm>
-            <a:off x="6027261" y="3124884"/>
-            <a:ext cx="6008376" cy="2585323"/>
-          </a:xfrm>
-          <a:prstGeom prst="rect">
-            <a:avLst/>
-          </a:prstGeom>
-          <a:noFill/>
-        </p:spPr>
-        <p:txBody>
-          <a:bodyPr wrap="none" rtlCol="0">
-            <a:spAutoFit/>
-          </a:bodyPr>
-          <a:lstStyle/>
-          <a:p>
-            <a:pPr marL="285750" indent="-285750">
-              <a:buFontTx/>
-              <a:buChar char="-"/>
-            </a:pPr>
-            <a:r>
-              <a:rPr lang="en-AU" dirty="0"/>
-              <a:t>The Scatter Chart Shows the relationship</a:t>
-            </a:r>
-          </a:p>
-          <a:p>
-            <a:r>
-              <a:rPr lang="en-AU" dirty="0"/>
-              <a:t>     between the increase in Fast-food Restaurants</a:t>
-            </a:r>
-          </a:p>
-          <a:p>
-            <a:r>
-              <a:rPr lang="en-AU" dirty="0"/>
-              <a:t>     vs increase in population</a:t>
-            </a:r>
-          </a:p>
-          <a:p>
-            <a:endParaRPr lang="en-AU" dirty="0"/>
-          </a:p>
-          <a:p>
-            <a:pPr marL="285750" indent="-285750">
-              <a:buFontTx/>
-              <a:buChar char="-"/>
-            </a:pPr>
-            <a:r>
-              <a:rPr lang="en-US" dirty="0"/>
-              <a:t>The more accessible the fast-food restaurant </a:t>
-            </a:r>
-          </a:p>
-          <a:p>
-            <a:r>
-              <a:rPr lang="en-US" dirty="0"/>
-              <a:t>    the higher the obesity rate</a:t>
-            </a:r>
-          </a:p>
-          <a:p>
-            <a:endParaRPr lang="en-US" dirty="0"/>
-          </a:p>
-          <a:p>
-            <a:pPr marL="285750" indent="-285750">
-              <a:buFontTx/>
-              <a:buChar char="-"/>
-            </a:pPr>
-            <a:r>
-              <a:rPr lang="en-US" dirty="0"/>
-              <a:t>Increasing in the Number of Fast-Food Outlets has</a:t>
-            </a:r>
-          </a:p>
-          <a:p>
-            <a:r>
-              <a:rPr lang="en-US" dirty="0"/>
-              <a:t>     a significant role in higher Obesity rate</a:t>
-            </a:r>
-            <a:endParaRPr lang="en-AU" dirty="0"/>
-          </a:p>
-        </p:txBody>
-      </p:sp>
-      <p:pic>
-        <p:nvPicPr>
-          <p:cNvPr id="6" name="Content Placeholder 5" descr="Chart, scatter chart&#10;&#10;Description automatically generated">
-            <a:extLst>
-              <a:ext uri="{FF2B5EF4-FFF2-40B4-BE49-F238E27FC236}">
-                <a16:creationId xmlns:a16="http://schemas.microsoft.com/office/drawing/2014/main" id="{7A3CB079-427F-445A-B5AE-A55FE39C44A2}"/>
-              </a:ext>
-            </a:extLst>
-          </p:cNvPr>
-          <p:cNvPicPr>
-            <a:picLocks noGrp="1" noChangeAspect="1"/>
-          </p:cNvPicPr>
-          <p:nvPr>
-            <p:ph idx="1"/>
-          </p:nvPr>
-        </p:nvPicPr>
-        <p:blipFill>
-          <a:blip r:embed="rId2">
-            <a:extLst>
-              <a:ext uri="{28A0092B-C50C-407E-A947-70E740481C1C}">
-                <a14:useLocalDpi xmlns:a14="http://schemas.microsoft.com/office/drawing/2010/main" val="0"/>
-              </a:ext>
-            </a:extLst>
-          </a:blip>
-          <a:stretch>
-            <a:fillRect/>
-          </a:stretch>
-        </p:blipFill>
-        <p:spPr>
-          <a:xfrm>
-            <a:off x="487680" y="2374899"/>
-            <a:ext cx="5482545" cy="3655031"/>
-          </a:xfrm>
-        </p:spPr>
-      </p:pic>
-    </p:spTree>
-    <p:extLst>
-      <p:ext uri="{BB962C8B-B14F-4D97-AF65-F5344CB8AC3E}">
-        <p14:creationId xmlns:p14="http://schemas.microsoft.com/office/powerpoint/2010/main" val="4138505094"/>
       </p:ext>
     </p:extLst>
   </p:cSld>

</xml_diff>

<commit_message>
final update on PPT
</commit_message>
<xml_diff>
--- a/O3_presentation_V2.pptx
+++ b/O3_presentation_V2.pptx
@@ -5,32 +5,33 @@
     <p:sldMasterId id="2147483660" r:id="rId1"/>
   </p:sldMasterIdLst>
   <p:notesMasterIdLst>
-    <p:notesMasterId r:id="rId25"/>
+    <p:notesMasterId r:id="rId26"/>
   </p:notesMasterIdLst>
   <p:sldIdLst>
     <p:sldId id="256" r:id="rId2"/>
     <p:sldId id="257" r:id="rId3"/>
     <p:sldId id="258" r:id="rId4"/>
-    <p:sldId id="259" r:id="rId5"/>
-    <p:sldId id="266" r:id="rId6"/>
-    <p:sldId id="262" r:id="rId7"/>
-    <p:sldId id="276" r:id="rId8"/>
-    <p:sldId id="269" r:id="rId9"/>
-    <p:sldId id="277" r:id="rId10"/>
-    <p:sldId id="278" r:id="rId11"/>
-    <p:sldId id="279" r:id="rId12"/>
-    <p:sldId id="263" r:id="rId13"/>
-    <p:sldId id="280" r:id="rId14"/>
-    <p:sldId id="281" r:id="rId15"/>
-    <p:sldId id="274" r:id="rId16"/>
-    <p:sldId id="268" r:id="rId17"/>
-    <p:sldId id="260" r:id="rId18"/>
-    <p:sldId id="261" r:id="rId19"/>
-    <p:sldId id="270" r:id="rId20"/>
-    <p:sldId id="271" r:id="rId21"/>
-    <p:sldId id="272" r:id="rId22"/>
-    <p:sldId id="273" r:id="rId23"/>
-    <p:sldId id="275" r:id="rId24"/>
+    <p:sldId id="282" r:id="rId5"/>
+    <p:sldId id="259" r:id="rId6"/>
+    <p:sldId id="266" r:id="rId7"/>
+    <p:sldId id="262" r:id="rId8"/>
+    <p:sldId id="276" r:id="rId9"/>
+    <p:sldId id="269" r:id="rId10"/>
+    <p:sldId id="277" r:id="rId11"/>
+    <p:sldId id="278" r:id="rId12"/>
+    <p:sldId id="279" r:id="rId13"/>
+    <p:sldId id="263" r:id="rId14"/>
+    <p:sldId id="280" r:id="rId15"/>
+    <p:sldId id="281" r:id="rId16"/>
+    <p:sldId id="274" r:id="rId17"/>
+    <p:sldId id="268" r:id="rId18"/>
+    <p:sldId id="260" r:id="rId19"/>
+    <p:sldId id="261" r:id="rId20"/>
+    <p:sldId id="270" r:id="rId21"/>
+    <p:sldId id="271" r:id="rId22"/>
+    <p:sldId id="272" r:id="rId23"/>
+    <p:sldId id="273" r:id="rId24"/>
+    <p:sldId id="275" r:id="rId25"/>
   </p:sldIdLst>
   <p:sldSz cx="12192000" cy="6858000"/>
   <p:notesSz cx="6858000" cy="9144000"/>
@@ -13722,24 +13723,87 @@
         </p:nvSpPr>
         <p:spPr/>
         <p:txBody>
-          <a:bodyPr/>
+          <a:bodyPr>
+            <a:normAutofit/>
+          </a:bodyPr>
           <a:lstStyle/>
           <a:p>
             <a:r>
-              <a:rPr lang="en-AU" dirty="0" err="1"/>
+              <a:rPr lang="en-AU" sz="2000" dirty="0" err="1"/>
               <a:t>Tacklin</a:t>
             </a:r>
             <a:r>
-              <a:rPr lang="en-AU" dirty="0"/>
+              <a:rPr lang="en-AU" sz="2000" dirty="0"/>
               <a:t>’ Obesity in ‘</a:t>
             </a:r>
             <a:r>
-              <a:rPr lang="en-AU" dirty="0" err="1"/>
+              <a:rPr lang="en-AU" sz="2000" dirty="0" err="1"/>
               <a:t>Merica</a:t>
             </a:r>
             <a:r>
-              <a:rPr lang="en-AU" dirty="0"/>
+              <a:rPr lang="en-AU" sz="2000" dirty="0"/>
               <a:t> </a:t>
+            </a:r>
+          </a:p>
+          <a:p>
+            <a:endParaRPr lang="en-AU" sz="2000" dirty="0"/>
+          </a:p>
+          <a:p>
+            <a:endParaRPr lang="en-AU" sz="2000" dirty="0"/>
+          </a:p>
+        </p:txBody>
+      </p:sp>
+      <p:sp>
+        <p:nvSpPr>
+          <p:cNvPr id="4" name="TextBox 3">
+            <a:extLst>
+              <a:ext uri="{FF2B5EF4-FFF2-40B4-BE49-F238E27FC236}">
+                <a16:creationId xmlns:a16="http://schemas.microsoft.com/office/drawing/2014/main" id="{AC108E5A-03FA-4778-BC1D-2E7960F981A9}"/>
+              </a:ext>
+            </a:extLst>
+          </p:cNvPr>
+          <p:cNvSpPr txBox="1"/>
+          <p:nvPr/>
+        </p:nvSpPr>
+        <p:spPr>
+          <a:xfrm>
+            <a:off x="1154955" y="5553074"/>
+            <a:ext cx="9989295" cy="369332"/>
+          </a:xfrm>
+          <a:prstGeom prst="rect">
+            <a:avLst/>
+          </a:prstGeom>
+          <a:noFill/>
+        </p:spPr>
+        <p:txBody>
+          <a:bodyPr wrap="square" rtlCol="0">
+            <a:spAutoFit/>
+          </a:bodyPr>
+          <a:lstStyle/>
+          <a:p>
+            <a:r>
+              <a:rPr lang="en-AU" b="1" dirty="0">
+                <a:solidFill>
+                  <a:schemeClr val="bg2"/>
+                </a:solidFill>
+              </a:rPr>
+              <a:t>Team Members: Amin , FX, </a:t>
+            </a:r>
+            <a:r>
+              <a:rPr lang="en-AU" b="1" dirty="0" err="1">
+                <a:solidFill>
+                  <a:schemeClr val="bg2"/>
+                </a:solidFill>
+              </a:rPr>
+              <a:t>Narisara</a:t>
+            </a:r>
+            <a:r>
+              <a:rPr lang="en-AU" b="1" dirty="0">
+                <a:solidFill>
+                  <a:schemeClr val="bg2"/>
+                </a:solidFill>
+              </a:rPr>
+              <a:t>, Rajesh</a:t>
             </a:r>
           </a:p>
         </p:txBody>
@@ -13797,7 +13861,7 @@
           <a:p>
             <a:r>
               <a:rPr lang="en-AU" dirty="0"/>
-              <a:t>RELATIONSHIP (POPULATION VS FAST FOOD RESTAURANTS)</a:t>
+              <a:t>RELATIONSHIP (OBESITY VS FAST FOOD)</a:t>
             </a:r>
           </a:p>
         </p:txBody>
@@ -13946,7 +14010,7 @@
           <a:p>
             <a:r>
               <a:rPr lang="en-US" dirty="0"/>
-              <a:t>The correlation between both factors is 0.99</a:t>
+              <a:t>The correlation between both factors is 0.75</a:t>
             </a:r>
             <a:endParaRPr lang="en-AU" dirty="0"/>
           </a:p>
@@ -14029,6 +14093,454 @@
               <a:tabLst/>
             </a:pPr>
             <a:r>
+              <a:rPr kumimoji="0" lang="en-US" altLang="en-US" sz="1000" b="0" i="0" u="none" strike="noStrike" cap="none" normalizeH="0" baseline="0" dirty="0">
+                <a:ln>
+                  <a:noFill/>
+                </a:ln>
+                <a:solidFill>
+                  <a:srgbClr val="000000"/>
+                </a:solidFill>
+                <a:effectLst/>
+                <a:latin typeface="Courier New" panose="02070309020205020404" pitchFamily="49" charset="0"/>
+              </a:rPr>
+              <a:t>The correlation between both factors is 0.75</a:t>
+            </a:r>
+            <a:r>
+              <a:rPr kumimoji="0" lang="en-US" altLang="en-US" sz="800" b="0" i="0" u="none" strike="noStrike" cap="none" normalizeH="0" baseline="0" dirty="0">
+                <a:ln>
+                  <a:noFill/>
+                </a:ln>
+                <a:solidFill>
+                  <a:schemeClr val="tx1"/>
+                </a:solidFill>
+                <a:effectLst/>
+              </a:rPr>
+              <a:t> </a:t>
+            </a:r>
+            <a:endParaRPr kumimoji="0" lang="en-US" altLang="en-US" sz="1800" b="0" i="0" u="none" strike="noStrike" cap="none" normalizeH="0" baseline="0" dirty="0">
+              <a:ln>
+                <a:noFill/>
+              </a:ln>
+              <a:solidFill>
+                <a:schemeClr val="tx1"/>
+              </a:solidFill>
+              <a:effectLst/>
+              <a:latin typeface="Arial" panose="020B0604020202020204" pitchFamily="34" charset="0"/>
+            </a:endParaRPr>
+          </a:p>
+        </p:txBody>
+      </p:sp>
+      <p:sp>
+        <p:nvSpPr>
+          <p:cNvPr id="12" name="TextBox 11">
+            <a:extLst>
+              <a:ext uri="{FF2B5EF4-FFF2-40B4-BE49-F238E27FC236}">
+                <a16:creationId xmlns:a16="http://schemas.microsoft.com/office/drawing/2014/main" id="{EEB4A170-3B65-4376-9960-F38F59068B97}"/>
+              </a:ext>
+            </a:extLst>
+          </p:cNvPr>
+          <p:cNvSpPr txBox="1"/>
+          <p:nvPr/>
+        </p:nvSpPr>
+        <p:spPr>
+          <a:xfrm>
+            <a:off x="6027261" y="3124884"/>
+            <a:ext cx="6098144" cy="2862322"/>
+          </a:xfrm>
+          <a:prstGeom prst="rect">
+            <a:avLst/>
+          </a:prstGeom>
+          <a:noFill/>
+        </p:spPr>
+        <p:txBody>
+          <a:bodyPr wrap="none" rtlCol="0">
+            <a:spAutoFit/>
+          </a:bodyPr>
+          <a:lstStyle/>
+          <a:p>
+            <a:pPr marL="285750" indent="-285750">
+              <a:buFontTx/>
+              <a:buChar char="-"/>
+            </a:pPr>
+            <a:r>
+              <a:rPr lang="en-AU" dirty="0"/>
+              <a:t>The Scatter Chart Shows the relationship</a:t>
+            </a:r>
+          </a:p>
+          <a:p>
+            <a:r>
+              <a:rPr lang="en-AU" dirty="0"/>
+              <a:t>     between the Fast-food Restaurants availability</a:t>
+            </a:r>
+          </a:p>
+          <a:p>
+            <a:r>
+              <a:rPr lang="en-AU" dirty="0"/>
+              <a:t>     for every 10K Residents (Capita)</a:t>
+            </a:r>
+          </a:p>
+          <a:p>
+            <a:endParaRPr lang="en-AU" dirty="0"/>
+          </a:p>
+          <a:p>
+            <a:pPr marL="285750" indent="-285750">
+              <a:buFontTx/>
+              <a:buChar char="-"/>
+            </a:pPr>
+            <a:r>
+              <a:rPr lang="en-US" dirty="0"/>
+              <a:t>The more accessible the fast-food restaurant </a:t>
+            </a:r>
+          </a:p>
+          <a:p>
+            <a:r>
+              <a:rPr lang="en-US" dirty="0"/>
+              <a:t>    the higher the obesity rate</a:t>
+            </a:r>
+          </a:p>
+          <a:p>
+            <a:endParaRPr lang="en-US" dirty="0"/>
+          </a:p>
+          <a:p>
+            <a:pPr marL="285750" indent="-285750">
+              <a:buFontTx/>
+              <a:buChar char="-"/>
+            </a:pPr>
+            <a:r>
+              <a:rPr lang="en-US" dirty="0"/>
+              <a:t>Availability of Fast-Food Restaurants are one </a:t>
+            </a:r>
+          </a:p>
+          <a:p>
+            <a:r>
+              <a:rPr lang="en-US" dirty="0"/>
+              <a:t>    of many factors behind the higher obesity among</a:t>
+            </a:r>
+          </a:p>
+          <a:p>
+            <a:r>
+              <a:rPr lang="en-US" dirty="0"/>
+              <a:t>    the states in US</a:t>
+            </a:r>
+            <a:endParaRPr lang="en-AU" dirty="0"/>
+          </a:p>
+        </p:txBody>
+      </p:sp>
+      <p:pic>
+        <p:nvPicPr>
+          <p:cNvPr id="6" name="Picture 5">
+            <a:extLst>
+              <a:ext uri="{FF2B5EF4-FFF2-40B4-BE49-F238E27FC236}">
+                <a16:creationId xmlns:a16="http://schemas.microsoft.com/office/drawing/2014/main" id="{1D107A41-DAE5-45D6-8A5B-30E8F5890C46}"/>
+              </a:ext>
+            </a:extLst>
+          </p:cNvPr>
+          <p:cNvPicPr>
+            <a:picLocks noChangeAspect="1"/>
+          </p:cNvPicPr>
+          <p:nvPr/>
+        </p:nvPicPr>
+        <p:blipFill>
+          <a:blip r:embed="rId2"/>
+          <a:stretch>
+            <a:fillRect/>
+          </a:stretch>
+        </p:blipFill>
+        <p:spPr>
+          <a:xfrm>
+            <a:off x="458305" y="2367641"/>
+            <a:ext cx="5485714" cy="3657143"/>
+          </a:xfrm>
+          <a:prstGeom prst="rect">
+            <a:avLst/>
+          </a:prstGeom>
+        </p:spPr>
+      </p:pic>
+    </p:spTree>
+    <p:extLst>
+      <p:ext uri="{BB962C8B-B14F-4D97-AF65-F5344CB8AC3E}">
+        <p14:creationId xmlns:p14="http://schemas.microsoft.com/office/powerpoint/2010/main" val="2399947885"/>
+      </p:ext>
+    </p:extLst>
+  </p:cSld>
+  <p:clrMapOvr>
+    <a:masterClrMapping/>
+  </p:clrMapOvr>
+</p:sld>
+</file>
+
+<file path=ppt/slides/slide11.xml><?xml version="1.0" encoding="utf-8"?>
+<p:sld xmlns:a="http://schemas.openxmlformats.org/drawingml/2006/main" xmlns:r="http://schemas.openxmlformats.org/officeDocument/2006/relationships" xmlns:p="http://schemas.openxmlformats.org/presentationml/2006/main">
+  <p:cSld>
+    <p:spTree>
+      <p:nvGrpSpPr>
+        <p:cNvPr id="1" name=""/>
+        <p:cNvGrpSpPr/>
+        <p:nvPr/>
+      </p:nvGrpSpPr>
+      <p:grpSpPr>
+        <a:xfrm>
+          <a:off x="0" y="0"/>
+          <a:ext cx="0" cy="0"/>
+          <a:chOff x="0" y="0"/>
+          <a:chExt cx="0" cy="0"/>
+        </a:xfrm>
+      </p:grpSpPr>
+      <p:sp>
+        <p:nvSpPr>
+          <p:cNvPr id="2" name="Title 1">
+            <a:extLst>
+              <a:ext uri="{FF2B5EF4-FFF2-40B4-BE49-F238E27FC236}">
+                <a16:creationId xmlns:a16="http://schemas.microsoft.com/office/drawing/2014/main" id="{65395B54-E758-4630-AA1F-47AC01C17D3B}"/>
+              </a:ext>
+            </a:extLst>
+          </p:cNvPr>
+          <p:cNvSpPr>
+            <a:spLocks noGrp="1"/>
+          </p:cNvSpPr>
+          <p:nvPr>
+            <p:ph type="title"/>
+          </p:nvPr>
+        </p:nvSpPr>
+        <p:spPr/>
+        <p:txBody>
+          <a:bodyPr/>
+          <a:lstStyle/>
+          <a:p>
+            <a:r>
+              <a:rPr lang="en-AU" dirty="0"/>
+              <a:t>RELATIONSHIP (POPULATION VS FAST FOOD RESTAURANTS)</a:t>
+            </a:r>
+          </a:p>
+        </p:txBody>
+      </p:sp>
+      <p:sp>
+        <p:nvSpPr>
+          <p:cNvPr id="9" name="Rectangle 1">
+            <a:extLst>
+              <a:ext uri="{FF2B5EF4-FFF2-40B4-BE49-F238E27FC236}">
+                <a16:creationId xmlns:a16="http://schemas.microsoft.com/office/drawing/2014/main" id="{AAF0AD85-B5C3-4760-BA51-3272B5BF7C30}"/>
+              </a:ext>
+            </a:extLst>
+          </p:cNvPr>
+          <p:cNvSpPr>
+            <a:spLocks noChangeArrowheads="1"/>
+          </p:cNvSpPr>
+          <p:nvPr/>
+        </p:nvSpPr>
+        <p:spPr bwMode="auto">
+          <a:xfrm>
+            <a:off x="0" y="0"/>
+            <a:ext cx="12192000" cy="457200"/>
+          </a:xfrm>
+          <a:prstGeom prst="rect">
+            <a:avLst/>
+          </a:prstGeom>
+          <a:solidFill>
+            <a:srgbClr val="FFFFFF"/>
+          </a:solidFill>
+          <a:ln>
+            <a:noFill/>
+          </a:ln>
+          <a:effectLst/>
+          <a:extLst>
+            <a:ext uri="{91240B29-F687-4F45-9708-019B960494DF}">
+              <a14:hiddenLine xmlns:a14="http://schemas.microsoft.com/office/drawing/2010/main" w="9525">
+                <a:solidFill>
+                  <a:schemeClr val="tx1"/>
+                </a:solidFill>
+                <a:miter lim="800000"/>
+                <a:headEnd/>
+                <a:tailEnd/>
+              </a14:hiddenLine>
+            </a:ext>
+            <a:ext uri="{AF507438-7753-43E0-B8FC-AC1667EBCBE1}">
+              <a14:hiddenEffects xmlns:a14="http://schemas.microsoft.com/office/drawing/2010/main">
+                <a:effectLst>
+                  <a:outerShdw dist="35921" dir="2700000" algn="ctr" rotWithShape="0">
+                    <a:schemeClr val="bg2"/>
+                  </a:outerShdw>
+                </a:effectLst>
+              </a14:hiddenEffects>
+            </a:ext>
+          </a:extLst>
+        </p:spPr>
+        <p:txBody>
+          <a:bodyPr vert="horz" wrap="none" lIns="0" tIns="0" rIns="0" bIns="0" numCol="1" anchor="ctr" anchorCtr="0" compatLnSpc="1">
+            <a:prstTxWarp prst="textNoShape">
+              <a:avLst/>
+            </a:prstTxWarp>
+            <a:spAutoFit/>
+          </a:bodyPr>
+          <a:lstStyle/>
+          <a:p>
+            <a:pPr marL="0" marR="0" lvl="0" indent="0" algn="l" defTabSz="914400" rtl="0" eaLnBrk="0" fontAlgn="base" latinLnBrk="0" hangingPunct="0">
+              <a:lnSpc>
+                <a:spcPct val="100000"/>
+              </a:lnSpc>
+              <a:spcBef>
+                <a:spcPct val="0"/>
+              </a:spcBef>
+              <a:spcAft>
+                <a:spcPct val="0"/>
+              </a:spcAft>
+              <a:buClrTx/>
+              <a:buSzTx/>
+              <a:buFontTx/>
+              <a:buNone/>
+              <a:tabLst/>
+            </a:pPr>
+            <a:r>
+              <a:rPr kumimoji="0" lang="en-US" altLang="en-US" sz="1000" b="0" i="0" u="none" strike="noStrike" cap="none" normalizeH="0" baseline="0">
+                <a:ln>
+                  <a:noFill/>
+                </a:ln>
+                <a:solidFill>
+                  <a:srgbClr val="000000"/>
+                </a:solidFill>
+                <a:effectLst/>
+                <a:latin typeface="Courier New" panose="02070309020205020404" pitchFamily="49" charset="0"/>
+              </a:rPr>
+              <a:t>The correlation between both factors is 0.75</a:t>
+            </a:r>
+            <a:r>
+              <a:rPr kumimoji="0" lang="en-US" altLang="en-US" sz="800" b="0" i="0" u="none" strike="noStrike" cap="none" normalizeH="0" baseline="0">
+                <a:ln>
+                  <a:noFill/>
+                </a:ln>
+                <a:solidFill>
+                  <a:schemeClr val="tx1"/>
+                </a:solidFill>
+                <a:effectLst/>
+              </a:rPr>
+              <a:t> </a:t>
+            </a:r>
+            <a:endParaRPr kumimoji="0" lang="en-US" altLang="en-US" sz="1800" b="0" i="0" u="none" strike="noStrike" cap="none" normalizeH="0" baseline="0">
+              <a:ln>
+                <a:noFill/>
+              </a:ln>
+              <a:solidFill>
+                <a:schemeClr val="tx1"/>
+              </a:solidFill>
+              <a:effectLst/>
+              <a:latin typeface="Arial" panose="020B0604020202020204" pitchFamily="34" charset="0"/>
+            </a:endParaRPr>
+          </a:p>
+        </p:txBody>
+      </p:sp>
+      <p:sp>
+        <p:nvSpPr>
+          <p:cNvPr id="10" name="TextBox 9">
+            <a:extLst>
+              <a:ext uri="{FF2B5EF4-FFF2-40B4-BE49-F238E27FC236}">
+                <a16:creationId xmlns:a16="http://schemas.microsoft.com/office/drawing/2014/main" id="{BD99EE48-D14D-4ABC-96A1-64200ED7B86F}"/>
+              </a:ext>
+            </a:extLst>
+          </p:cNvPr>
+          <p:cNvSpPr txBox="1"/>
+          <p:nvPr/>
+        </p:nvSpPr>
+        <p:spPr>
+          <a:xfrm>
+            <a:off x="902812" y="6267450"/>
+            <a:ext cx="5067413" cy="369332"/>
+          </a:xfrm>
+          <a:prstGeom prst="rect">
+            <a:avLst/>
+          </a:prstGeom>
+          <a:noFill/>
+        </p:spPr>
+        <p:txBody>
+          <a:bodyPr wrap="none" rtlCol="0">
+            <a:spAutoFit/>
+          </a:bodyPr>
+          <a:lstStyle/>
+          <a:p>
+            <a:r>
+              <a:rPr lang="en-US" dirty="0"/>
+              <a:t>The correlation between both factors is 0.99</a:t>
+            </a:r>
+            <a:endParaRPr lang="en-AU" dirty="0"/>
+          </a:p>
+        </p:txBody>
+      </p:sp>
+      <p:sp>
+        <p:nvSpPr>
+          <p:cNvPr id="11" name="Rectangle 2">
+            <a:extLst>
+              <a:ext uri="{FF2B5EF4-FFF2-40B4-BE49-F238E27FC236}">
+                <a16:creationId xmlns:a16="http://schemas.microsoft.com/office/drawing/2014/main" id="{156E7540-53FE-476D-B803-F82DB68BFBF8}"/>
+              </a:ext>
+            </a:extLst>
+          </p:cNvPr>
+          <p:cNvSpPr>
+            <a:spLocks noChangeArrowheads="1"/>
+          </p:cNvSpPr>
+          <p:nvPr/>
+        </p:nvSpPr>
+        <p:spPr bwMode="auto">
+          <a:xfrm>
+            <a:off x="152400" y="152400"/>
+            <a:ext cx="12192000" cy="457200"/>
+          </a:xfrm>
+          <a:prstGeom prst="rect">
+            <a:avLst/>
+          </a:prstGeom>
+          <a:solidFill>
+            <a:srgbClr val="FFFFFF"/>
+          </a:solidFill>
+          <a:ln>
+            <a:noFill/>
+          </a:ln>
+          <a:effectLst/>
+          <a:extLst>
+            <a:ext uri="{91240B29-F687-4F45-9708-019B960494DF}">
+              <a14:hiddenLine xmlns:a14="http://schemas.microsoft.com/office/drawing/2010/main" w="9525">
+                <a:solidFill>
+                  <a:schemeClr val="tx1"/>
+                </a:solidFill>
+                <a:miter lim="800000"/>
+                <a:headEnd/>
+                <a:tailEnd/>
+              </a14:hiddenLine>
+            </a:ext>
+            <a:ext uri="{AF507438-7753-43E0-B8FC-AC1667EBCBE1}">
+              <a14:hiddenEffects xmlns:a14="http://schemas.microsoft.com/office/drawing/2010/main">
+                <a:effectLst>
+                  <a:outerShdw dist="35921" dir="2700000" algn="ctr" rotWithShape="0">
+                    <a:schemeClr val="bg2"/>
+                  </a:outerShdw>
+                </a:effectLst>
+              </a14:hiddenEffects>
+            </a:ext>
+          </a:extLst>
+        </p:spPr>
+        <p:txBody>
+          <a:bodyPr vert="horz" wrap="none" lIns="0" tIns="0" rIns="0" bIns="0" numCol="1" anchor="ctr" anchorCtr="0" compatLnSpc="1">
+            <a:prstTxWarp prst="textNoShape">
+              <a:avLst/>
+            </a:prstTxWarp>
+            <a:spAutoFit/>
+          </a:bodyPr>
+          <a:lstStyle/>
+          <a:p>
+            <a:pPr marL="0" marR="0" lvl="0" indent="0" algn="l" defTabSz="914400" rtl="0" eaLnBrk="0" fontAlgn="base" latinLnBrk="0" hangingPunct="0">
+              <a:lnSpc>
+                <a:spcPct val="100000"/>
+              </a:lnSpc>
+              <a:spcBef>
+                <a:spcPct val="0"/>
+              </a:spcBef>
+              <a:spcAft>
+                <a:spcPct val="0"/>
+              </a:spcAft>
+              <a:buClrTx/>
+              <a:buSzTx/>
+              <a:buFontTx/>
+              <a:buNone/>
+              <a:tabLst/>
+            </a:pPr>
+            <a:r>
               <a:rPr kumimoji="0" lang="en-US" altLang="en-US" sz="1000" b="0" i="0" u="none" strike="noStrike" cap="none" normalizeH="0" baseline="0">
                 <a:ln>
                   <a:noFill/>
@@ -14204,7 +14716,7 @@
 </p:sld>
 </file>
 
-<file path=ppt/slides/slide11.xml><?xml version="1.0" encoding="utf-8"?>
+<file path=ppt/slides/slide12.xml><?xml version="1.0" encoding="utf-8"?>
 <p:sld xmlns:a="http://schemas.openxmlformats.org/drawingml/2006/main" xmlns:r="http://schemas.openxmlformats.org/officeDocument/2006/relationships" xmlns:p="http://schemas.openxmlformats.org/presentationml/2006/main">
   <p:cSld>
     <p:spTree>
@@ -14615,7 +15127,7 @@
 </p:sld>
 </file>
 
-<file path=ppt/slides/slide12.xml><?xml version="1.0" encoding="utf-8"?>
+<file path=ppt/slides/slide13.xml><?xml version="1.0" encoding="utf-8"?>
 <p:sld xmlns:a="http://schemas.openxmlformats.org/drawingml/2006/main" xmlns:r="http://schemas.openxmlformats.org/officeDocument/2006/relationships" xmlns:p="http://schemas.openxmlformats.org/presentationml/2006/main">
   <p:cSld>
     <p:spTree>
@@ -14824,7 +15336,7 @@
 </p:sld>
 </file>
 
-<file path=ppt/slides/slide13.xml><?xml version="1.0" encoding="utf-8"?>
+<file path=ppt/slides/slide14.xml><?xml version="1.0" encoding="utf-8"?>
 <p:sld xmlns:a="http://schemas.openxmlformats.org/drawingml/2006/main" xmlns:r="http://schemas.openxmlformats.org/officeDocument/2006/relationships" xmlns:p="http://schemas.openxmlformats.org/presentationml/2006/main">
   <p:cSld>
     <p:spTree>
@@ -15207,7 +15719,7 @@
 </p:sld>
 </file>
 
-<file path=ppt/slides/slide14.xml><?xml version="1.0" encoding="utf-8"?>
+<file path=ppt/slides/slide15.xml><?xml version="1.0" encoding="utf-8"?>
 <p:sld xmlns:a="http://schemas.openxmlformats.org/drawingml/2006/main" xmlns:r="http://schemas.openxmlformats.org/officeDocument/2006/relationships" xmlns:p="http://schemas.openxmlformats.org/presentationml/2006/main">
   <p:cSld>
     <p:spTree>
@@ -15408,7 +15920,7 @@
 </p:sld>
 </file>
 
-<file path=ppt/slides/slide15.xml><?xml version="1.0" encoding="utf-8"?>
+<file path=ppt/slides/slide16.xml><?xml version="1.0" encoding="utf-8"?>
 <p:sld xmlns:a="http://schemas.openxmlformats.org/drawingml/2006/main" xmlns:r="http://schemas.openxmlformats.org/officeDocument/2006/relationships" xmlns:p="http://schemas.openxmlformats.org/presentationml/2006/main">
   <p:cSld>
     <p:spTree>
@@ -15471,8 +15983,8 @@
         </p:nvSpPr>
         <p:spPr bwMode="auto">
           <a:xfrm>
-            <a:off x="341832" y="3167748"/>
-            <a:ext cx="10706469" cy="2287806"/>
+            <a:off x="454566" y="2326376"/>
+            <a:ext cx="10706469" cy="4196020"/>
           </a:xfrm>
           <a:prstGeom prst="rect">
             <a:avLst/>
@@ -15537,46 +16049,46 @@
               <a:tabLst/>
             </a:pPr>
             <a:r>
-              <a:rPr lang="en-US" sz="1200" dirty="0">
+              <a:rPr lang="en-US" sz="1600" dirty="0">
                 <a:solidFill>
                   <a:srgbClr val="000000"/>
                 </a:solidFill>
-                <a:latin typeface="Helvetica Neue"/>
+                <a:latin typeface="Century Gothic (Body)"/>
               </a:rPr>
               <a:t>Based on the study conducted by Li Ming Wen and Chris </a:t>
             </a:r>
             <a:r>
-              <a:rPr lang="en-US" sz="1200" dirty="0" err="1">
+              <a:rPr lang="en-US" sz="1600" dirty="0" err="1">
                 <a:solidFill>
                   <a:srgbClr val="000000"/>
                 </a:solidFill>
-                <a:latin typeface="Helvetica Neue"/>
+                <a:latin typeface="Century Gothic (Body)"/>
               </a:rPr>
               <a:t>Rissel</a:t>
             </a:r>
             <a:r>
-              <a:rPr lang="en-US" sz="1200" dirty="0">
+              <a:rPr lang="en-US" sz="1600" dirty="0">
                 <a:solidFill>
                   <a:srgbClr val="000000"/>
                 </a:solidFill>
-                <a:latin typeface="Helvetica Neue"/>
+                <a:latin typeface="Century Gothic (Body)"/>
               </a:rPr>
               <a:t> on</a:t>
             </a:r>
             <a:br>
-              <a:rPr lang="en-US" sz="1200" dirty="0">
+              <a:rPr lang="en-US" sz="1600" dirty="0">
                 <a:solidFill>
                   <a:srgbClr val="000000"/>
                 </a:solidFill>
-                <a:latin typeface="Helvetica Neue"/>
+                <a:latin typeface="Century Gothic (Body)"/>
               </a:rPr>
             </a:br>
             <a:r>
-              <a:rPr lang="en-US" sz="1200" dirty="0">
+              <a:rPr lang="en-US" sz="1600" dirty="0">
                 <a:solidFill>
                   <a:srgbClr val="000000"/>
                 </a:solidFill>
-                <a:latin typeface="Helvetica Neue"/>
+                <a:latin typeface="Century Gothic (Body)"/>
               </a:rPr>
               <a:t>Inverse associations between cycling to work, public transport, and overweight and obesity: </a:t>
             </a:r>
@@ -15599,30 +16111,30 @@
               <a:tabLst/>
             </a:pPr>
             <a:r>
-              <a:rPr lang="en-US" sz="1200" dirty="0">
+              <a:rPr lang="en-US" sz="1600" dirty="0">
                 <a:solidFill>
                   <a:srgbClr val="000000"/>
                 </a:solidFill>
-                <a:latin typeface="Helvetica Neue"/>
+                <a:latin typeface="Century Gothic (Body)"/>
               </a:rPr>
               <a:t>Findings from a population based study in Australia link : </a:t>
             </a:r>
             <a:r>
-              <a:rPr lang="en-US" sz="1200" u="sng" dirty="0">
+              <a:rPr lang="en-US" sz="1600" u="sng" dirty="0">
                 <a:solidFill>
                   <a:srgbClr val="296EAA"/>
                 </a:solidFill>
-                <a:latin typeface="Helvetica Neue"/>
+                <a:latin typeface="Century Gothic (Body)"/>
                 <a:hlinkClick r:id="rId2"/>
               </a:rPr>
               <a:t>https://www.sciencedirect.com/science/article/abs/pii/S0091743507003714</a:t>
             </a:r>
             <a:r>
-              <a:rPr lang="en-US" sz="1200" dirty="0">
+              <a:rPr lang="en-US" sz="1600" dirty="0">
                 <a:solidFill>
                   <a:srgbClr val="000000"/>
                 </a:solidFill>
-                <a:latin typeface="Helvetica Neue"/>
+                <a:latin typeface="Century Gothic (Body)"/>
               </a:rPr>
               <a:t> </a:t>
             </a:r>
@@ -15632,29 +16144,29 @@
               <a:buNone/>
             </a:pPr>
             <a:r>
-              <a:rPr lang="en-US" sz="1200" dirty="0">
+              <a:rPr lang="en-US" sz="1600" dirty="0">
                 <a:solidFill>
                   <a:srgbClr val="000000"/>
                 </a:solidFill>
-                <a:latin typeface="Helvetica Neue"/>
+                <a:latin typeface="Century Gothic (Body)"/>
               </a:rPr>
               <a:t>Health Promotion Service, Sydney South West Area Health Service, Level 9, King George V Building, Missenden Road, Camperdown, NSW 2050, Australia</a:t>
             </a:r>
             <a:br>
-              <a:rPr lang="en-US" sz="1200" dirty="0">
+              <a:rPr lang="en-US" sz="1600" dirty="0">
                 <a:solidFill>
                   <a:srgbClr val="000000"/>
                 </a:solidFill>
-                <a:latin typeface="Helvetica Neue"/>
+                <a:latin typeface="Century Gothic (Body)"/>
               </a:rPr>
             </a:br>
             <a:r>
-              <a:rPr lang="en-US" sz="1200" b="0" dirty="0">
+              <a:rPr lang="en-US" sz="1600" b="0" dirty="0">
                 <a:solidFill>
                   <a:srgbClr val="505050"/>
                 </a:solidFill>
                 <a:effectLst/>
-                <a:latin typeface="Helvetica Neue"/>
+                <a:latin typeface="Century Gothic (Body)"/>
               </a:rPr>
               <a:t>Methods.</a:t>
             </a:r>
@@ -15664,31 +16176,31 @@
               <a:buNone/>
             </a:pPr>
             <a:r>
-              <a:rPr lang="en-US" sz="1200" b="0" dirty="0">
+              <a:rPr lang="en-US" sz="1600" b="0" dirty="0">
                 <a:solidFill>
                   <a:srgbClr val="2E2E2E"/>
                 </a:solidFill>
                 <a:effectLst/>
-                <a:latin typeface="Helvetica Neue"/>
+                <a:latin typeface="Century Gothic (Body)"/>
               </a:rPr>
               <a:t>The study was conducted using data from a representative sample of 6810 respondents who reported being in the workforce, extracted from the 2003 New South Wales Adult Health Survey, Australia. </a:t>
             </a:r>
             <a:r>
-              <a:rPr lang="en-US" sz="1200" dirty="0">
+              <a:rPr lang="en-US" sz="1600" dirty="0">
                 <a:solidFill>
                   <a:schemeClr val="tx1"/>
                 </a:solidFill>
-                <a:latin typeface="Helvetica Neue"/>
+                <a:latin typeface="Century Gothic (Body)"/>
               </a:rPr>
               <a:t>Logistic regression </a:t>
             </a:r>
             <a:r>
-              <a:rPr lang="en-US" sz="1200" b="0" dirty="0">
+              <a:rPr lang="en-US" sz="1600" b="0" dirty="0">
                 <a:solidFill>
                   <a:srgbClr val="2E2E2E"/>
                 </a:solidFill>
                 <a:effectLst/>
-                <a:latin typeface="Helvetica Neue"/>
+                <a:latin typeface="Century Gothic (Body)"/>
               </a:rPr>
               <a:t>modeling adjusted for potential confounders.</a:t>
             </a:r>
@@ -15711,57 +16223,57 @@
               <a:tabLst/>
             </a:pPr>
             <a:br>
-              <a:rPr lang="en-US" sz="1200" dirty="0">
+              <a:rPr lang="en-US" sz="1600" dirty="0">
                 <a:solidFill>
                   <a:srgbClr val="000000"/>
                 </a:solidFill>
-                <a:latin typeface="Helvetica Neue"/>
+                <a:latin typeface="Century Gothic (Body)"/>
               </a:rPr>
             </a:br>
             <a:r>
-              <a:rPr lang="en-US" sz="1200" dirty="0">
+              <a:rPr lang="en-US" sz="1600" dirty="0">
                 <a:solidFill>
                   <a:srgbClr val="000000"/>
                 </a:solidFill>
-                <a:latin typeface="Helvetica Neue"/>
+                <a:latin typeface="Century Gothic (Body)"/>
               </a:rPr>
               <a:t>1. Population using public transport to work were significantly less likely to be overweight and obese. </a:t>
             </a:r>
             <a:br>
-              <a:rPr lang="en-US" sz="1200" dirty="0">
+              <a:rPr lang="en-US" sz="1600" dirty="0">
                 <a:solidFill>
                   <a:srgbClr val="000000"/>
                 </a:solidFill>
-                <a:latin typeface="Helvetica Neue"/>
+                <a:latin typeface="Century Gothic (Body)"/>
               </a:rPr>
             </a:br>
             <a:r>
-              <a:rPr lang="en-US" sz="1200" dirty="0">
+              <a:rPr lang="en-US" sz="1600" dirty="0">
                 <a:solidFill>
                   <a:srgbClr val="000000"/>
                 </a:solidFill>
-                <a:latin typeface="Helvetica Neue"/>
+                <a:latin typeface="Century Gothic (Body)"/>
               </a:rPr>
               <a:t>2. It is clearly visibly that there is a moderate negative correlation between the use if public transport and the obesity rate. </a:t>
             </a:r>
             <a:br>
-              <a:rPr lang="en-US" sz="1200" dirty="0">
+              <a:rPr lang="en-US" sz="1600" dirty="0">
                 <a:solidFill>
                   <a:srgbClr val="000000"/>
                 </a:solidFill>
-                <a:latin typeface="Helvetica Neue"/>
+                <a:latin typeface="Century Gothic (Body)"/>
               </a:rPr>
             </a:br>
             <a:r>
-              <a:rPr lang="en-US" sz="1200" dirty="0">
+              <a:rPr lang="en-US" sz="1600" dirty="0">
                 <a:solidFill>
                   <a:srgbClr val="000000"/>
                 </a:solidFill>
-                <a:latin typeface="Helvetica Neue"/>
+                <a:latin typeface="Century Gothic (Body)"/>
               </a:rPr>
               <a:t>3. It is clearly visibly that there is a strong positive correlation between the use of personal vehicle and the obesity rate.</a:t>
             </a:r>
-            <a:endParaRPr kumimoji="0" lang="en-US" altLang="en-US" sz="1200" b="0" i="0" u="none" strike="noStrike" cap="none" normalizeH="0" baseline="0" dirty="0">
+            <a:endParaRPr kumimoji="0" lang="en-US" altLang="en-US" sz="1600" b="0" i="0" u="none" strike="noStrike" cap="none" normalizeH="0" baseline="0" dirty="0">
               <a:ln>
                 <a:noFill/>
               </a:ln>
@@ -15769,7 +16281,7 @@
                 <a:schemeClr val="tx1"/>
               </a:solidFill>
               <a:effectLst/>
-              <a:latin typeface="Arial" panose="020B0604020202020204" pitchFamily="34" charset="0"/>
+              <a:latin typeface="Century Gothic (Body)"/>
             </a:endParaRPr>
           </a:p>
         </p:txBody>
@@ -15787,7 +16299,7 @@
 </p:sld>
 </file>
 
-<file path=ppt/slides/slide16.xml><?xml version="1.0" encoding="utf-8"?>
+<file path=ppt/slides/slide17.xml><?xml version="1.0" encoding="utf-8"?>
 <p:sld xmlns:a="http://schemas.openxmlformats.org/drawingml/2006/main" xmlns:r="http://schemas.openxmlformats.org/officeDocument/2006/relationships" xmlns:p="http://schemas.openxmlformats.org/presentationml/2006/main">
   <p:cSld>
     <p:spTree>
@@ -15976,7 +16488,7 @@
 </p:sld>
 </file>
 
-<file path=ppt/slides/slide17.xml><?xml version="1.0" encoding="utf-8"?>
+<file path=ppt/slides/slide18.xml><?xml version="1.0" encoding="utf-8"?>
 <p:sld xmlns:a="http://schemas.openxmlformats.org/drawingml/2006/main" xmlns:r="http://schemas.openxmlformats.org/officeDocument/2006/relationships" xmlns:p="http://schemas.openxmlformats.org/presentationml/2006/main">
   <p:cSld>
     <p:spTree>
@@ -16218,7 +16730,7 @@
 </p:sld>
 </file>
 
-<file path=ppt/slides/slide18.xml><?xml version="1.0" encoding="utf-8"?>
+<file path=ppt/slides/slide19.xml><?xml version="1.0" encoding="utf-8"?>
 <p:sld xmlns:a="http://schemas.openxmlformats.org/drawingml/2006/main" xmlns:r="http://schemas.openxmlformats.org/officeDocument/2006/relationships" xmlns:p="http://schemas.openxmlformats.org/presentationml/2006/main">
   <p:cSld>
     <p:spTree>
@@ -16711,7 +17223,223 @@
 </p:sld>
 </file>
 
-<file path=ppt/slides/slide19.xml><?xml version="1.0" encoding="utf-8"?>
+<file path=ppt/slides/slide2.xml><?xml version="1.0" encoding="utf-8"?>
+<p:sld xmlns:a="http://schemas.openxmlformats.org/drawingml/2006/main" xmlns:r="http://schemas.openxmlformats.org/officeDocument/2006/relationships" xmlns:p="http://schemas.openxmlformats.org/presentationml/2006/main">
+  <p:cSld>
+    <p:spTree>
+      <p:nvGrpSpPr>
+        <p:cNvPr id="1" name=""/>
+        <p:cNvGrpSpPr/>
+        <p:nvPr/>
+      </p:nvGrpSpPr>
+      <p:grpSpPr>
+        <a:xfrm>
+          <a:off x="0" y="0"/>
+          <a:ext cx="0" cy="0"/>
+          <a:chOff x="0" y="0"/>
+          <a:chExt cx="0" cy="0"/>
+        </a:xfrm>
+      </p:grpSpPr>
+      <p:sp>
+        <p:nvSpPr>
+          <p:cNvPr id="2" name="Title 1">
+            <a:extLst>
+              <a:ext uri="{FF2B5EF4-FFF2-40B4-BE49-F238E27FC236}">
+                <a16:creationId xmlns:a16="http://schemas.microsoft.com/office/drawing/2014/main" id="{0148C890-0A4A-49E3-8086-5DEAD3FD878F}"/>
+              </a:ext>
+            </a:extLst>
+          </p:cNvPr>
+          <p:cNvSpPr>
+            <a:spLocks noGrp="1"/>
+          </p:cNvSpPr>
+          <p:nvPr>
+            <p:ph type="title"/>
+          </p:nvPr>
+        </p:nvSpPr>
+        <p:spPr/>
+        <p:txBody>
+          <a:bodyPr/>
+          <a:lstStyle/>
+          <a:p>
+            <a:r>
+              <a:rPr lang="en-AU" dirty="0"/>
+              <a:t>Project Introduction	</a:t>
+            </a:r>
+          </a:p>
+        </p:txBody>
+      </p:sp>
+      <p:sp>
+        <p:nvSpPr>
+          <p:cNvPr id="3" name="Content Placeholder 2">
+            <a:extLst>
+              <a:ext uri="{FF2B5EF4-FFF2-40B4-BE49-F238E27FC236}">
+                <a16:creationId xmlns:a16="http://schemas.microsoft.com/office/drawing/2014/main" id="{F37675AD-20F2-4A1C-8C45-DFAD2C88EA90}"/>
+              </a:ext>
+            </a:extLst>
+          </p:cNvPr>
+          <p:cNvSpPr>
+            <a:spLocks noGrp="1"/>
+          </p:cNvSpPr>
+          <p:nvPr>
+            <p:ph idx="1"/>
+          </p:nvPr>
+        </p:nvSpPr>
+        <p:spPr>
+          <a:xfrm>
+            <a:off x="1154954" y="2348917"/>
+            <a:ext cx="8825659" cy="4353887"/>
+          </a:xfrm>
+        </p:spPr>
+        <p:txBody>
+          <a:bodyPr>
+            <a:normAutofit fontScale="92500" lnSpcReduction="10000"/>
+          </a:bodyPr>
+          <a:lstStyle/>
+          <a:p>
+            <a:r>
+              <a:rPr lang="en-US" b="0" i="0" dirty="0">
+                <a:effectLst/>
+                <a:latin typeface="-apple-system"/>
+              </a:rPr>
+              <a:t>What classifies someone as Obese? </a:t>
+            </a:r>
+          </a:p>
+          <a:p>
+            <a:pPr lvl="1"/>
+            <a:r>
+              <a:rPr lang="en-US" b="0" i="0" dirty="0">
+                <a:effectLst/>
+                <a:latin typeface="-apple-system"/>
+              </a:rPr>
+              <a:t>Body Mass Index (BMI) of over 30</a:t>
+            </a:r>
+            <a:r>
+              <a:rPr lang="en-US" b="0" i="0" u="none" strike="noStrike" baseline="-25000" dirty="0">
+                <a:effectLst/>
+                <a:latin typeface="-apple-system"/>
+                <a:hlinkClick r:id="rId2">
+                  <a:extLst>
+                    <a:ext uri="{A12FA001-AC4F-418D-AE19-62706E023703}">
+                      <ahyp:hlinkClr xmlns:ahyp="http://schemas.microsoft.com/office/drawing/2018/hyperlinkcolor" val="tx"/>
+                    </a:ext>
+                  </a:extLst>
+                </a:hlinkClick>
+              </a:rPr>
+              <a:t> [2]</a:t>
+            </a:r>
+            <a:endParaRPr lang="en-US" b="0" i="0" dirty="0">
+              <a:effectLst/>
+              <a:latin typeface="-apple-system"/>
+            </a:endParaRPr>
+          </a:p>
+          <a:p>
+            <a:r>
+              <a:rPr lang="en-US" dirty="0">
+                <a:latin typeface="-apple-system"/>
+              </a:rPr>
+              <a:t>What causes Obesity?</a:t>
+            </a:r>
+          </a:p>
+          <a:p>
+            <a:pPr lvl="1"/>
+            <a:r>
+              <a:rPr lang="en-US" b="0" i="0" dirty="0">
+                <a:effectLst/>
+                <a:latin typeface="-apple-system"/>
+              </a:rPr>
+              <a:t>Complex, combination of behavior and genetics</a:t>
+            </a:r>
+            <a:endParaRPr lang="en-US" dirty="0">
+              <a:latin typeface="-apple-system"/>
+            </a:endParaRPr>
+          </a:p>
+          <a:p>
+            <a:r>
+              <a:rPr lang="en-US" b="0" i="0" dirty="0">
+                <a:effectLst/>
+                <a:latin typeface="-apple-system"/>
+              </a:rPr>
+              <a:t>What we are looking for?</a:t>
+            </a:r>
+          </a:p>
+          <a:p>
+            <a:pPr lvl="1"/>
+            <a:r>
+              <a:rPr lang="en-US" b="0" i="0" dirty="0">
+                <a:effectLst/>
+                <a:latin typeface="-apple-system"/>
+              </a:rPr>
+              <a:t>Gathered data from various sources to identify the strength of the relationship between obesity and it’s contributing factors. </a:t>
+            </a:r>
+          </a:p>
+          <a:p>
+            <a:r>
+              <a:rPr lang="en-US" b="0" i="0" dirty="0">
+                <a:effectLst/>
+                <a:latin typeface="-apple-system"/>
+              </a:rPr>
+              <a:t>What we will be covering?</a:t>
+            </a:r>
+          </a:p>
+          <a:p>
+            <a:pPr lvl="1"/>
+            <a:r>
+              <a:rPr lang="en-US" dirty="0">
+                <a:latin typeface="-apple-system"/>
+              </a:rPr>
+              <a:t>Fast F</a:t>
+            </a:r>
+            <a:r>
+              <a:rPr lang="en-US" b="0" i="0" dirty="0">
+                <a:effectLst/>
+                <a:latin typeface="-apple-system"/>
+              </a:rPr>
+              <a:t>ood restaurants availability, public transport availability, physical activeness, and general public’s age group in the 50 states of United States of America.</a:t>
+            </a:r>
+          </a:p>
+          <a:p>
+            <a:r>
+              <a:rPr lang="en-US" dirty="0">
+                <a:latin typeface="-apple-system"/>
+              </a:rPr>
+              <a:t>Why?</a:t>
+            </a:r>
+          </a:p>
+          <a:p>
+            <a:pPr lvl="1"/>
+            <a:r>
+              <a:rPr lang="en-US" b="0" i="0" dirty="0">
+                <a:effectLst/>
+                <a:latin typeface="-apple-system"/>
+              </a:rPr>
+              <a:t>Obesity is serious because it is associated with poorer mental health outcomes and reduced quality of life. Obesity is also associated with the leading causes of death in the United States and worldwide, including diabetes, heart disease, stroke, and some types of cancer.</a:t>
+            </a:r>
+          </a:p>
+          <a:p>
+            <a:pPr marL="457200" lvl="1" indent="0">
+              <a:buNone/>
+            </a:pPr>
+            <a:endParaRPr lang="en-US" b="0" i="0" dirty="0">
+              <a:effectLst/>
+              <a:latin typeface="-apple-system"/>
+            </a:endParaRPr>
+          </a:p>
+        </p:txBody>
+      </p:sp>
+    </p:spTree>
+    <p:extLst>
+      <p:ext uri="{BB962C8B-B14F-4D97-AF65-F5344CB8AC3E}">
+        <p14:creationId xmlns:p14="http://schemas.microsoft.com/office/powerpoint/2010/main" val="2307991246"/>
+      </p:ext>
+    </p:extLst>
+  </p:cSld>
+  <p:clrMapOvr>
+    <a:masterClrMapping/>
+  </p:clrMapOvr>
+</p:sld>
+</file>
+
+<file path=ppt/slides/slide20.xml><?xml version="1.0" encoding="utf-8"?>
 <p:sld xmlns:a="http://schemas.openxmlformats.org/drawingml/2006/main" xmlns:r="http://schemas.openxmlformats.org/officeDocument/2006/relationships" xmlns:p="http://schemas.openxmlformats.org/presentationml/2006/main">
   <p:cSld>
     <p:spTree>
@@ -16903,223 +17631,7 @@
 </p:sld>
 </file>
 
-<file path=ppt/slides/slide2.xml><?xml version="1.0" encoding="utf-8"?>
-<p:sld xmlns:a="http://schemas.openxmlformats.org/drawingml/2006/main" xmlns:r="http://schemas.openxmlformats.org/officeDocument/2006/relationships" xmlns:p="http://schemas.openxmlformats.org/presentationml/2006/main">
-  <p:cSld>
-    <p:spTree>
-      <p:nvGrpSpPr>
-        <p:cNvPr id="1" name=""/>
-        <p:cNvGrpSpPr/>
-        <p:nvPr/>
-      </p:nvGrpSpPr>
-      <p:grpSpPr>
-        <a:xfrm>
-          <a:off x="0" y="0"/>
-          <a:ext cx="0" cy="0"/>
-          <a:chOff x="0" y="0"/>
-          <a:chExt cx="0" cy="0"/>
-        </a:xfrm>
-      </p:grpSpPr>
-      <p:sp>
-        <p:nvSpPr>
-          <p:cNvPr id="2" name="Title 1">
-            <a:extLst>
-              <a:ext uri="{FF2B5EF4-FFF2-40B4-BE49-F238E27FC236}">
-                <a16:creationId xmlns:a16="http://schemas.microsoft.com/office/drawing/2014/main" id="{0148C890-0A4A-49E3-8086-5DEAD3FD878F}"/>
-              </a:ext>
-            </a:extLst>
-          </p:cNvPr>
-          <p:cNvSpPr>
-            <a:spLocks noGrp="1"/>
-          </p:cNvSpPr>
-          <p:nvPr>
-            <p:ph type="title"/>
-          </p:nvPr>
-        </p:nvSpPr>
-        <p:spPr/>
-        <p:txBody>
-          <a:bodyPr/>
-          <a:lstStyle/>
-          <a:p>
-            <a:r>
-              <a:rPr lang="en-AU" dirty="0"/>
-              <a:t>Project Introduction	</a:t>
-            </a:r>
-          </a:p>
-        </p:txBody>
-      </p:sp>
-      <p:sp>
-        <p:nvSpPr>
-          <p:cNvPr id="3" name="Content Placeholder 2">
-            <a:extLst>
-              <a:ext uri="{FF2B5EF4-FFF2-40B4-BE49-F238E27FC236}">
-                <a16:creationId xmlns:a16="http://schemas.microsoft.com/office/drawing/2014/main" id="{F37675AD-20F2-4A1C-8C45-DFAD2C88EA90}"/>
-              </a:ext>
-            </a:extLst>
-          </p:cNvPr>
-          <p:cNvSpPr>
-            <a:spLocks noGrp="1"/>
-          </p:cNvSpPr>
-          <p:nvPr>
-            <p:ph idx="1"/>
-          </p:nvPr>
-        </p:nvSpPr>
-        <p:spPr>
-          <a:xfrm>
-            <a:off x="1154954" y="2348917"/>
-            <a:ext cx="8825659" cy="4353887"/>
-          </a:xfrm>
-        </p:spPr>
-        <p:txBody>
-          <a:bodyPr>
-            <a:normAutofit fontScale="92500" lnSpcReduction="10000"/>
-          </a:bodyPr>
-          <a:lstStyle/>
-          <a:p>
-            <a:r>
-              <a:rPr lang="en-US" b="0" i="0" dirty="0">
-                <a:effectLst/>
-                <a:latin typeface="-apple-system"/>
-              </a:rPr>
-              <a:t>What classifies someone as Obese? </a:t>
-            </a:r>
-          </a:p>
-          <a:p>
-            <a:pPr lvl="1"/>
-            <a:r>
-              <a:rPr lang="en-US" b="0" i="0" dirty="0">
-                <a:effectLst/>
-                <a:latin typeface="-apple-system"/>
-              </a:rPr>
-              <a:t>Body Mass Index (BMI) of over 30</a:t>
-            </a:r>
-            <a:r>
-              <a:rPr lang="en-US" b="0" i="0" u="none" strike="noStrike" baseline="-25000" dirty="0">
-                <a:effectLst/>
-                <a:latin typeface="-apple-system"/>
-                <a:hlinkClick r:id="rId2">
-                  <a:extLst>
-                    <a:ext uri="{A12FA001-AC4F-418D-AE19-62706E023703}">
-                      <ahyp:hlinkClr xmlns:ahyp="http://schemas.microsoft.com/office/drawing/2018/hyperlinkcolor" val="tx"/>
-                    </a:ext>
-                  </a:extLst>
-                </a:hlinkClick>
-              </a:rPr>
-              <a:t> [2]</a:t>
-            </a:r>
-            <a:endParaRPr lang="en-US" b="0" i="0" dirty="0">
-              <a:effectLst/>
-              <a:latin typeface="-apple-system"/>
-            </a:endParaRPr>
-          </a:p>
-          <a:p>
-            <a:r>
-              <a:rPr lang="en-US" dirty="0">
-                <a:latin typeface="-apple-system"/>
-              </a:rPr>
-              <a:t>What causes Obesity?</a:t>
-            </a:r>
-          </a:p>
-          <a:p>
-            <a:pPr lvl="1"/>
-            <a:r>
-              <a:rPr lang="en-US" b="0" i="0" dirty="0">
-                <a:effectLst/>
-                <a:latin typeface="-apple-system"/>
-              </a:rPr>
-              <a:t>Complex, combination of behavior and genetics</a:t>
-            </a:r>
-            <a:endParaRPr lang="en-US" dirty="0">
-              <a:latin typeface="-apple-system"/>
-            </a:endParaRPr>
-          </a:p>
-          <a:p>
-            <a:r>
-              <a:rPr lang="en-US" b="0" i="0" dirty="0">
-                <a:effectLst/>
-                <a:latin typeface="-apple-system"/>
-              </a:rPr>
-              <a:t>What we are looking for?</a:t>
-            </a:r>
-          </a:p>
-          <a:p>
-            <a:pPr lvl="1"/>
-            <a:r>
-              <a:rPr lang="en-US" b="0" i="0" dirty="0">
-                <a:effectLst/>
-                <a:latin typeface="-apple-system"/>
-              </a:rPr>
-              <a:t>Gathered data from various sources to identify the strength of the relationship between obesity and it’s contributing factors. </a:t>
-            </a:r>
-          </a:p>
-          <a:p>
-            <a:r>
-              <a:rPr lang="en-US" b="0" i="0" dirty="0">
-                <a:effectLst/>
-                <a:latin typeface="-apple-system"/>
-              </a:rPr>
-              <a:t>What we will be covering?</a:t>
-            </a:r>
-          </a:p>
-          <a:p>
-            <a:pPr lvl="1"/>
-            <a:r>
-              <a:rPr lang="en-US" dirty="0">
-                <a:latin typeface="-apple-system"/>
-              </a:rPr>
-              <a:t>Fast F</a:t>
-            </a:r>
-            <a:r>
-              <a:rPr lang="en-US" b="0" i="0" dirty="0">
-                <a:effectLst/>
-                <a:latin typeface="-apple-system"/>
-              </a:rPr>
-              <a:t>ood restaurants availability, public transport availability, physical activeness, and general public’s age group in the 50 states of United States of America.</a:t>
-            </a:r>
-          </a:p>
-          <a:p>
-            <a:r>
-              <a:rPr lang="en-US" dirty="0">
-                <a:latin typeface="-apple-system"/>
-              </a:rPr>
-              <a:t>Why?</a:t>
-            </a:r>
-          </a:p>
-          <a:p>
-            <a:pPr lvl="1"/>
-            <a:r>
-              <a:rPr lang="en-US" b="0" i="0" dirty="0">
-                <a:effectLst/>
-                <a:latin typeface="-apple-system"/>
-              </a:rPr>
-              <a:t>Obesity is serious because it is associated with poorer mental health outcomes and reduced quality of life. Obesity is also associated with the leading causes of death in the United States and worldwide, including diabetes, heart disease, stroke, and some types of cancer.</a:t>
-            </a:r>
-          </a:p>
-          <a:p>
-            <a:pPr marL="457200" lvl="1" indent="0">
-              <a:buNone/>
-            </a:pPr>
-            <a:endParaRPr lang="en-US" b="0" i="0" dirty="0">
-              <a:effectLst/>
-              <a:latin typeface="-apple-system"/>
-            </a:endParaRPr>
-          </a:p>
-        </p:txBody>
-      </p:sp>
-    </p:spTree>
-    <p:extLst>
-      <p:ext uri="{BB962C8B-B14F-4D97-AF65-F5344CB8AC3E}">
-        <p14:creationId xmlns:p14="http://schemas.microsoft.com/office/powerpoint/2010/main" val="2307991246"/>
-      </p:ext>
-    </p:extLst>
-  </p:cSld>
-  <p:clrMapOvr>
-    <a:masterClrMapping/>
-  </p:clrMapOvr>
-</p:sld>
-</file>
-
-<file path=ppt/slides/slide20.xml><?xml version="1.0" encoding="utf-8"?>
+<file path=ppt/slides/slide21.xml><?xml version="1.0" encoding="utf-8"?>
 <p:sld xmlns:a="http://schemas.openxmlformats.org/drawingml/2006/main" xmlns:r="http://schemas.openxmlformats.org/officeDocument/2006/relationships" xmlns:p="http://schemas.openxmlformats.org/presentationml/2006/main">
   <p:cSld>
     <p:spTree>
@@ -17207,7 +17719,7 @@
 </p:sld>
 </file>
 
-<file path=ppt/slides/slide21.xml><?xml version="1.0" encoding="utf-8"?>
+<file path=ppt/slides/slide22.xml><?xml version="1.0" encoding="utf-8"?>
 <p:sld xmlns:a="http://schemas.openxmlformats.org/drawingml/2006/main" xmlns:r="http://schemas.openxmlformats.org/officeDocument/2006/relationships" xmlns:p="http://schemas.openxmlformats.org/presentationml/2006/main">
   <p:cSld>
     <p:spTree>
@@ -17314,7 +17826,7 @@
 </p:sld>
 </file>
 
-<file path=ppt/slides/slide22.xml><?xml version="1.0" encoding="utf-8"?>
+<file path=ppt/slides/slide23.xml><?xml version="1.0" encoding="utf-8"?>
 <p:sld xmlns:a="http://schemas.openxmlformats.org/drawingml/2006/main" xmlns:r="http://schemas.openxmlformats.org/officeDocument/2006/relationships" xmlns:p="http://schemas.openxmlformats.org/presentationml/2006/main">
   <p:cSld>
     <p:spTree>
@@ -17424,7 +17936,7 @@
 </p:sld>
 </file>
 
-<file path=ppt/slides/slide23.xml><?xml version="1.0" encoding="utf-8"?>
+<file path=ppt/slides/slide24.xml><?xml version="1.0" encoding="utf-8"?>
 <p:sld xmlns:a="http://schemas.openxmlformats.org/drawingml/2006/main" xmlns:r="http://schemas.openxmlformats.org/officeDocument/2006/relationships" xmlns:p="http://schemas.openxmlformats.org/presentationml/2006/main">
   <p:cSld>
     <p:bg>
@@ -18425,7 +18937,7 @@
         <p:spPr/>
         <p:txBody>
           <a:bodyPr>
-            <a:normAutofit fontScale="85000" lnSpcReduction="10000"/>
+            <a:normAutofit fontScale="92500" lnSpcReduction="20000"/>
           </a:bodyPr>
           <a:lstStyle/>
           <a:p>
@@ -18479,53 +18991,9 @@
               </a:rPr>
               <a:t>Fast food -Include all restaurants in Number of restaurants per state (Heat Map number of Restaurant vs Obesity)</a:t>
             </a:r>
-            <a:br>
-              <a:rPr lang="en-US" b="0" i="0" dirty="0">
-                <a:effectLst/>
-                <a:latin typeface="-apple-system"/>
-              </a:rPr>
-            </a:br>
-            <a:r>
-              <a:rPr lang="en-US" b="0" i="0" dirty="0">
-                <a:effectLst/>
-                <a:latin typeface="-apple-system"/>
-              </a:rPr>
-              <a:t>Top 5 Fast-food restaurants according to </a:t>
-            </a:r>
-            <a:r>
-              <a:rPr lang="en-US" b="0" i="0" u="none" strike="noStrike" dirty="0" err="1">
-                <a:effectLst/>
-                <a:latin typeface="-apple-system"/>
-                <a:hlinkClick r:id="rId2">
-                  <a:extLst>
-                    <a:ext uri="{A12FA001-AC4F-418D-AE19-62706E023703}">
-                      <ahyp:hlinkClr xmlns:ahyp="http://schemas.microsoft.com/office/drawing/2018/hyperlinkcolor" val="tx"/>
-                    </a:ext>
-                  </a:extLst>
-                </a:hlinkClick>
-              </a:rPr>
-              <a:t>Eatthis</a:t>
-            </a:r>
-            <a:r>
-              <a:rPr lang="en-US" b="0" i="0" dirty="0">
-                <a:effectLst/>
-                <a:latin typeface="-apple-system"/>
-              </a:rPr>
-              <a:t>- McDonald's, Starbucks, Chick-fil-A, Taco Bell, Burger King</a:t>
-            </a:r>
-            <a:br>
-              <a:rPr lang="en-US" b="0" i="0" dirty="0">
-                <a:effectLst/>
-                <a:latin typeface="-apple-system"/>
-              </a:rPr>
-            </a:br>
-            <a:r>
-              <a:rPr lang="en-US" b="0" i="0" dirty="0">
-                <a:effectLst/>
-                <a:latin typeface="-apple-system"/>
-              </a:rPr>
-              <a:t>Count restaurants for each states, use the dot size as the heat map.</a:t>
-            </a:r>
+            <a:endParaRPr lang="en-US" dirty="0">
+              <a:latin typeface="-apple-system"/>
+            </a:endParaRPr>
           </a:p>
           <a:p>
             <a:pPr algn="l">
@@ -18593,6 +19061,201 @@
           <p:cNvPr id="2" name="Title 1">
             <a:extLst>
               <a:ext uri="{FF2B5EF4-FFF2-40B4-BE49-F238E27FC236}">
+                <a16:creationId xmlns:a16="http://schemas.microsoft.com/office/drawing/2014/main" id="{F604AB98-F625-4D3F-83B1-5B61D2194773}"/>
+              </a:ext>
+            </a:extLst>
+          </p:cNvPr>
+          <p:cNvSpPr>
+            <a:spLocks noGrp="1"/>
+          </p:cNvSpPr>
+          <p:nvPr>
+            <p:ph type="title"/>
+          </p:nvPr>
+        </p:nvSpPr>
+        <p:spPr/>
+        <p:txBody>
+          <a:bodyPr/>
+          <a:lstStyle/>
+          <a:p>
+            <a:r>
+              <a:rPr lang="en-AU" dirty="0"/>
+              <a:t>Data Sources</a:t>
+            </a:r>
+          </a:p>
+        </p:txBody>
+      </p:sp>
+      <p:sp>
+        <p:nvSpPr>
+          <p:cNvPr id="3" name="Content Placeholder 2">
+            <a:extLst>
+              <a:ext uri="{FF2B5EF4-FFF2-40B4-BE49-F238E27FC236}">
+                <a16:creationId xmlns:a16="http://schemas.microsoft.com/office/drawing/2014/main" id="{A890A207-4639-41A2-8EE4-0E8400AD1935}"/>
+              </a:ext>
+            </a:extLst>
+          </p:cNvPr>
+          <p:cNvSpPr>
+            <a:spLocks noGrp="1"/>
+          </p:cNvSpPr>
+          <p:nvPr>
+            <p:ph idx="1"/>
+          </p:nvPr>
+        </p:nvSpPr>
+        <p:spPr/>
+        <p:txBody>
+          <a:bodyPr>
+            <a:normAutofit/>
+          </a:bodyPr>
+          <a:lstStyle/>
+          <a:p>
+            <a:pPr algn="l">
+              <a:buFont typeface="Arial" panose="020B0604020202020204" pitchFamily="34" charset="0"/>
+              <a:buChar char="•"/>
+            </a:pPr>
+            <a:endParaRPr lang="en-AU" sz="2400" b="0" i="0" u="none" strike="noStrike" dirty="0">
+              <a:solidFill>
+                <a:srgbClr val="C9D1D9"/>
+              </a:solidFill>
+              <a:effectLst/>
+              <a:latin typeface="-apple-system"/>
+              <a:hlinkClick r:id="rId2"/>
+            </a:endParaRPr>
+          </a:p>
+          <a:p>
+            <a:pPr algn="l">
+              <a:buFont typeface="Arial" panose="020B0604020202020204" pitchFamily="34" charset="0"/>
+              <a:buChar char="•"/>
+            </a:pPr>
+            <a:r>
+              <a:rPr lang="en-AU" sz="2400" b="0" i="0" u="none" strike="noStrike" dirty="0">
+                <a:solidFill>
+                  <a:srgbClr val="C9D1D9"/>
+                </a:solidFill>
+                <a:effectLst/>
+                <a:latin typeface="-apple-system"/>
+                <a:hlinkClick r:id="rId2"/>
+              </a:rPr>
+              <a:t>https://open.cdc.gov/apis.html</a:t>
+            </a:r>
+            <a:endParaRPr lang="en-AU" sz="2400" b="0" i="0" dirty="0">
+              <a:solidFill>
+                <a:srgbClr val="C9D1D9"/>
+              </a:solidFill>
+              <a:effectLst/>
+              <a:latin typeface="-apple-system"/>
+            </a:endParaRPr>
+          </a:p>
+          <a:p>
+            <a:pPr algn="l">
+              <a:buFont typeface="Arial" panose="020B0604020202020204" pitchFamily="34" charset="0"/>
+              <a:buChar char="•"/>
+            </a:pPr>
+            <a:r>
+              <a:rPr lang="en-AU" sz="2400" b="0" i="0" u="none" strike="noStrike" dirty="0">
+                <a:solidFill>
+                  <a:srgbClr val="C9D1D9"/>
+                </a:solidFill>
+                <a:effectLst/>
+                <a:latin typeface="-apple-system"/>
+                <a:hlinkClick r:id="rId3"/>
+              </a:rPr>
+              <a:t>https://data.world/health/childhood-obesity-in-theus/workspace/file?filename=obesity_child_age.csv</a:t>
+            </a:r>
+            <a:endParaRPr lang="en-AU" sz="2400" b="0" i="0" dirty="0">
+              <a:solidFill>
+                <a:srgbClr val="C9D1D9"/>
+              </a:solidFill>
+              <a:effectLst/>
+              <a:latin typeface="-apple-system"/>
+            </a:endParaRPr>
+          </a:p>
+          <a:p>
+            <a:pPr algn="l">
+              <a:buFont typeface="Arial" panose="020B0604020202020204" pitchFamily="34" charset="0"/>
+              <a:buChar char="•"/>
+            </a:pPr>
+            <a:r>
+              <a:rPr lang="en-AU" sz="2400" b="0" i="0" u="none" strike="noStrike" dirty="0">
+                <a:solidFill>
+                  <a:srgbClr val="C9D1D9"/>
+                </a:solidFill>
+                <a:effectLst/>
+                <a:latin typeface="-apple-system"/>
+                <a:hlinkClick r:id="rId4"/>
+              </a:rPr>
+              <a:t>https://www.americashealthrankings.org/explore/annual/measure/obesity/state/ALL</a:t>
+            </a:r>
+            <a:endParaRPr lang="en-AU" sz="2400" b="0" i="0" dirty="0">
+              <a:solidFill>
+                <a:srgbClr val="C9D1D9"/>
+              </a:solidFill>
+              <a:effectLst/>
+              <a:latin typeface="-apple-system"/>
+            </a:endParaRPr>
+          </a:p>
+          <a:p>
+            <a:pPr algn="l">
+              <a:buFont typeface="Arial" panose="020B0604020202020204" pitchFamily="34" charset="0"/>
+              <a:buChar char="•"/>
+            </a:pPr>
+            <a:r>
+              <a:rPr lang="en-AU" sz="2400" b="0" i="0" u="none" strike="noStrike" dirty="0">
+                <a:solidFill>
+                  <a:srgbClr val="C9D1D9"/>
+                </a:solidFill>
+                <a:effectLst/>
+                <a:latin typeface="-apple-system"/>
+                <a:hlinkClick r:id="rId5"/>
+              </a:rPr>
+              <a:t>https://www.bts.gov/browse-statistical-products-and-data</a:t>
+            </a:r>
+            <a:endParaRPr lang="en-AU" sz="2400" b="0" i="0" dirty="0">
+              <a:solidFill>
+                <a:srgbClr val="C9D1D9"/>
+              </a:solidFill>
+              <a:effectLst/>
+              <a:latin typeface="-apple-system"/>
+            </a:endParaRPr>
+          </a:p>
+          <a:p>
+            <a:endParaRPr lang="en-AU" sz="2400" dirty="0"/>
+          </a:p>
+        </p:txBody>
+      </p:sp>
+    </p:spTree>
+    <p:extLst>
+      <p:ext uri="{BB962C8B-B14F-4D97-AF65-F5344CB8AC3E}">
+        <p14:creationId xmlns:p14="http://schemas.microsoft.com/office/powerpoint/2010/main" val="2770825940"/>
+      </p:ext>
+    </p:extLst>
+  </p:cSld>
+  <p:clrMapOvr>
+    <a:masterClrMapping/>
+  </p:clrMapOvr>
+</p:sld>
+</file>
+
+<file path=ppt/slides/slide5.xml><?xml version="1.0" encoding="utf-8"?>
+<p:sld xmlns:a="http://schemas.openxmlformats.org/drawingml/2006/main" xmlns:r="http://schemas.openxmlformats.org/officeDocument/2006/relationships" xmlns:p="http://schemas.openxmlformats.org/presentationml/2006/main">
+  <p:cSld>
+    <p:spTree>
+      <p:nvGrpSpPr>
+        <p:cNvPr id="1" name=""/>
+        <p:cNvGrpSpPr/>
+        <p:nvPr/>
+      </p:nvGrpSpPr>
+      <p:grpSpPr>
+        <a:xfrm>
+          <a:off x="0" y="0"/>
+          <a:ext cx="0" cy="0"/>
+          <a:chOff x="0" y="0"/>
+          <a:chExt cx="0" cy="0"/>
+        </a:xfrm>
+      </p:grpSpPr>
+      <p:sp>
+        <p:nvSpPr>
+          <p:cNvPr id="2" name="Title 1">
+            <a:extLst>
+              <a:ext uri="{FF2B5EF4-FFF2-40B4-BE49-F238E27FC236}">
                 <a16:creationId xmlns:a16="http://schemas.microsoft.com/office/drawing/2014/main" id="{91931067-67F3-411A-971C-3BE3252E56BB}"/>
               </a:ext>
             </a:extLst>
@@ -18781,7 +19444,7 @@
 </p:sld>
 </file>
 
-<file path=ppt/slides/slide5.xml><?xml version="1.0" encoding="utf-8"?>
+<file path=ppt/slides/slide6.xml><?xml version="1.0" encoding="utf-8"?>
 <p:sld xmlns:a="http://schemas.openxmlformats.org/drawingml/2006/main" xmlns:r="http://schemas.openxmlformats.org/officeDocument/2006/relationships" xmlns:p="http://schemas.openxmlformats.org/presentationml/2006/main">
   <p:cSld>
     <p:spTree>
@@ -18888,7 +19551,7 @@
 </p:sld>
 </file>
 
-<file path=ppt/slides/slide6.xml><?xml version="1.0" encoding="utf-8"?>
+<file path=ppt/slides/slide7.xml><?xml version="1.0" encoding="utf-8"?>
 <p:sld xmlns:a="http://schemas.openxmlformats.org/drawingml/2006/main" xmlns:r="http://schemas.openxmlformats.org/officeDocument/2006/relationships" xmlns:p="http://schemas.openxmlformats.org/presentationml/2006/main">
   <p:cSld>
     <p:spTree>
@@ -18991,7 +19654,7 @@
 </p:sld>
 </file>
 
-<file path=ppt/slides/slide7.xml><?xml version="1.0" encoding="utf-8"?>
+<file path=ppt/slides/slide8.xml><?xml version="1.0" encoding="utf-8"?>
 <p:sld xmlns:a="http://schemas.openxmlformats.org/drawingml/2006/main" xmlns:r="http://schemas.openxmlformats.org/officeDocument/2006/relationships" xmlns:p="http://schemas.openxmlformats.org/presentationml/2006/main">
   <p:cSld>
     <p:spTree>
@@ -19118,7 +19781,7 @@
 </p:sld>
 </file>
 
-<file path=ppt/slides/slide8.xml><?xml version="1.0" encoding="utf-8"?>
+<file path=ppt/slides/slide9.xml><?xml version="1.0" encoding="utf-8"?>
 <p:sld xmlns:a="http://schemas.openxmlformats.org/drawingml/2006/main" xmlns:r="http://schemas.openxmlformats.org/officeDocument/2006/relationships" xmlns:p="http://schemas.openxmlformats.org/presentationml/2006/main">
   <p:cSld>
     <p:spTree>
@@ -19358,459 +20021,6 @@
     <p:extLst>
       <p:ext uri="{BB962C8B-B14F-4D97-AF65-F5344CB8AC3E}">
         <p14:creationId xmlns:p14="http://schemas.microsoft.com/office/powerpoint/2010/main" val="1606014644"/>
-      </p:ext>
-    </p:extLst>
-  </p:cSld>
-  <p:clrMapOvr>
-    <a:masterClrMapping/>
-  </p:clrMapOvr>
-</p:sld>
-</file>
-
-<file path=ppt/slides/slide9.xml><?xml version="1.0" encoding="utf-8"?>
-<p:sld xmlns:a="http://schemas.openxmlformats.org/drawingml/2006/main" xmlns:r="http://schemas.openxmlformats.org/officeDocument/2006/relationships" xmlns:p="http://schemas.openxmlformats.org/presentationml/2006/main">
-  <p:cSld>
-    <p:spTree>
-      <p:nvGrpSpPr>
-        <p:cNvPr id="1" name=""/>
-        <p:cNvGrpSpPr/>
-        <p:nvPr/>
-      </p:nvGrpSpPr>
-      <p:grpSpPr>
-        <a:xfrm>
-          <a:off x="0" y="0"/>
-          <a:ext cx="0" cy="0"/>
-          <a:chOff x="0" y="0"/>
-          <a:chExt cx="0" cy="0"/>
-        </a:xfrm>
-      </p:grpSpPr>
-      <p:sp>
-        <p:nvSpPr>
-          <p:cNvPr id="2" name="Title 1">
-            <a:extLst>
-              <a:ext uri="{FF2B5EF4-FFF2-40B4-BE49-F238E27FC236}">
-                <a16:creationId xmlns:a16="http://schemas.microsoft.com/office/drawing/2014/main" id="{65395B54-E758-4630-AA1F-47AC01C17D3B}"/>
-              </a:ext>
-            </a:extLst>
-          </p:cNvPr>
-          <p:cNvSpPr>
-            <a:spLocks noGrp="1"/>
-          </p:cNvSpPr>
-          <p:nvPr>
-            <p:ph type="title"/>
-          </p:nvPr>
-        </p:nvSpPr>
-        <p:spPr/>
-        <p:txBody>
-          <a:bodyPr/>
-          <a:lstStyle/>
-          <a:p>
-            <a:r>
-              <a:rPr lang="en-AU" dirty="0"/>
-              <a:t>RELATIONSHIP (OBESITY VS FAST FOOD)</a:t>
-            </a:r>
-          </a:p>
-        </p:txBody>
-      </p:sp>
-      <p:pic>
-        <p:nvPicPr>
-          <p:cNvPr id="7" name="Content Placeholder 6" descr="Chart, scatter chart&#10;&#10;Description automatically generated">
-            <a:extLst>
-              <a:ext uri="{FF2B5EF4-FFF2-40B4-BE49-F238E27FC236}">
-                <a16:creationId xmlns:a16="http://schemas.microsoft.com/office/drawing/2014/main" id="{06BE126C-013B-492B-A205-A905E4951EDD}"/>
-              </a:ext>
-            </a:extLst>
-          </p:cNvPr>
-          <p:cNvPicPr>
-            <a:picLocks noGrp="1" noChangeAspect="1"/>
-          </p:cNvPicPr>
-          <p:nvPr>
-            <p:ph idx="1"/>
-          </p:nvPr>
-        </p:nvPicPr>
-        <p:blipFill>
-          <a:blip r:embed="rId2">
-            <a:extLst>
-              <a:ext uri="{28A0092B-C50C-407E-A947-70E740481C1C}">
-                <a14:useLocalDpi xmlns:a14="http://schemas.microsoft.com/office/drawing/2010/main" val="0"/>
-              </a:ext>
-            </a:extLst>
-          </a:blip>
-          <a:stretch>
-            <a:fillRect/>
-          </a:stretch>
-        </p:blipFill>
-        <p:spPr>
-          <a:xfrm>
-            <a:off x="548640" y="2603499"/>
-            <a:ext cx="5478621" cy="3652415"/>
-          </a:xfrm>
-        </p:spPr>
-      </p:pic>
-      <p:sp>
-        <p:nvSpPr>
-          <p:cNvPr id="9" name="Rectangle 1">
-            <a:extLst>
-              <a:ext uri="{FF2B5EF4-FFF2-40B4-BE49-F238E27FC236}">
-                <a16:creationId xmlns:a16="http://schemas.microsoft.com/office/drawing/2014/main" id="{AAF0AD85-B5C3-4760-BA51-3272B5BF7C30}"/>
-              </a:ext>
-            </a:extLst>
-          </p:cNvPr>
-          <p:cNvSpPr>
-            <a:spLocks noChangeArrowheads="1"/>
-          </p:cNvSpPr>
-          <p:nvPr/>
-        </p:nvSpPr>
-        <p:spPr bwMode="auto">
-          <a:xfrm>
-            <a:off x="0" y="0"/>
-            <a:ext cx="12192000" cy="457200"/>
-          </a:xfrm>
-          <a:prstGeom prst="rect">
-            <a:avLst/>
-          </a:prstGeom>
-          <a:solidFill>
-            <a:srgbClr val="FFFFFF"/>
-          </a:solidFill>
-          <a:ln>
-            <a:noFill/>
-          </a:ln>
-          <a:effectLst/>
-          <a:extLst>
-            <a:ext uri="{91240B29-F687-4F45-9708-019B960494DF}">
-              <a14:hiddenLine xmlns:a14="http://schemas.microsoft.com/office/drawing/2010/main" w="9525">
-                <a:solidFill>
-                  <a:schemeClr val="tx1"/>
-                </a:solidFill>
-                <a:miter lim="800000"/>
-                <a:headEnd/>
-                <a:tailEnd/>
-              </a14:hiddenLine>
-            </a:ext>
-            <a:ext uri="{AF507438-7753-43E0-B8FC-AC1667EBCBE1}">
-              <a14:hiddenEffects xmlns:a14="http://schemas.microsoft.com/office/drawing/2010/main">
-                <a:effectLst>
-                  <a:outerShdw dist="35921" dir="2700000" algn="ctr" rotWithShape="0">
-                    <a:schemeClr val="bg2"/>
-                  </a:outerShdw>
-                </a:effectLst>
-              </a14:hiddenEffects>
-            </a:ext>
-          </a:extLst>
-        </p:spPr>
-        <p:txBody>
-          <a:bodyPr vert="horz" wrap="none" lIns="0" tIns="0" rIns="0" bIns="0" numCol="1" anchor="ctr" anchorCtr="0" compatLnSpc="1">
-            <a:prstTxWarp prst="textNoShape">
-              <a:avLst/>
-            </a:prstTxWarp>
-            <a:spAutoFit/>
-          </a:bodyPr>
-          <a:lstStyle/>
-          <a:p>
-            <a:pPr marL="0" marR="0" lvl="0" indent="0" algn="l" defTabSz="914400" rtl="0" eaLnBrk="0" fontAlgn="base" latinLnBrk="0" hangingPunct="0">
-              <a:lnSpc>
-                <a:spcPct val="100000"/>
-              </a:lnSpc>
-              <a:spcBef>
-                <a:spcPct val="0"/>
-              </a:spcBef>
-              <a:spcAft>
-                <a:spcPct val="0"/>
-              </a:spcAft>
-              <a:buClrTx/>
-              <a:buSzTx/>
-              <a:buFontTx/>
-              <a:buNone/>
-              <a:tabLst/>
-            </a:pPr>
-            <a:r>
-              <a:rPr kumimoji="0" lang="en-US" altLang="en-US" sz="1000" b="0" i="0" u="none" strike="noStrike" cap="none" normalizeH="0" baseline="0">
-                <a:ln>
-                  <a:noFill/>
-                </a:ln>
-                <a:solidFill>
-                  <a:srgbClr val="000000"/>
-                </a:solidFill>
-                <a:effectLst/>
-                <a:latin typeface="Courier New" panose="02070309020205020404" pitchFamily="49" charset="0"/>
-              </a:rPr>
-              <a:t>The correlation between both factors is 0.75</a:t>
-            </a:r>
-            <a:r>
-              <a:rPr kumimoji="0" lang="en-US" altLang="en-US" sz="800" b="0" i="0" u="none" strike="noStrike" cap="none" normalizeH="0" baseline="0">
-                <a:ln>
-                  <a:noFill/>
-                </a:ln>
-                <a:solidFill>
-                  <a:schemeClr val="tx1"/>
-                </a:solidFill>
-                <a:effectLst/>
-              </a:rPr>
-              <a:t> </a:t>
-            </a:r>
-            <a:endParaRPr kumimoji="0" lang="en-US" altLang="en-US" sz="1800" b="0" i="0" u="none" strike="noStrike" cap="none" normalizeH="0" baseline="0">
-              <a:ln>
-                <a:noFill/>
-              </a:ln>
-              <a:solidFill>
-                <a:schemeClr val="tx1"/>
-              </a:solidFill>
-              <a:effectLst/>
-              <a:latin typeface="Arial" panose="020B0604020202020204" pitchFamily="34" charset="0"/>
-            </a:endParaRPr>
-          </a:p>
-        </p:txBody>
-      </p:sp>
-      <p:sp>
-        <p:nvSpPr>
-          <p:cNvPr id="10" name="TextBox 9">
-            <a:extLst>
-              <a:ext uri="{FF2B5EF4-FFF2-40B4-BE49-F238E27FC236}">
-                <a16:creationId xmlns:a16="http://schemas.microsoft.com/office/drawing/2014/main" id="{BD99EE48-D14D-4ABC-96A1-64200ED7B86F}"/>
-              </a:ext>
-            </a:extLst>
-          </p:cNvPr>
-          <p:cNvSpPr txBox="1"/>
-          <p:nvPr/>
-        </p:nvSpPr>
-        <p:spPr>
-          <a:xfrm>
-            <a:off x="902812" y="6267450"/>
-            <a:ext cx="5067413" cy="369332"/>
-          </a:xfrm>
-          <a:prstGeom prst="rect">
-            <a:avLst/>
-          </a:prstGeom>
-          <a:noFill/>
-        </p:spPr>
-        <p:txBody>
-          <a:bodyPr wrap="none" rtlCol="0">
-            <a:spAutoFit/>
-          </a:bodyPr>
-          <a:lstStyle/>
-          <a:p>
-            <a:r>
-              <a:rPr lang="en-US" dirty="0"/>
-              <a:t>The correlation between both factors is 0.75</a:t>
-            </a:r>
-            <a:endParaRPr lang="en-AU" dirty="0"/>
-          </a:p>
-        </p:txBody>
-      </p:sp>
-      <p:sp>
-        <p:nvSpPr>
-          <p:cNvPr id="11" name="Rectangle 2">
-            <a:extLst>
-              <a:ext uri="{FF2B5EF4-FFF2-40B4-BE49-F238E27FC236}">
-                <a16:creationId xmlns:a16="http://schemas.microsoft.com/office/drawing/2014/main" id="{156E7540-53FE-476D-B803-F82DB68BFBF8}"/>
-              </a:ext>
-            </a:extLst>
-          </p:cNvPr>
-          <p:cNvSpPr>
-            <a:spLocks noChangeArrowheads="1"/>
-          </p:cNvSpPr>
-          <p:nvPr/>
-        </p:nvSpPr>
-        <p:spPr bwMode="auto">
-          <a:xfrm>
-            <a:off x="152400" y="152400"/>
-            <a:ext cx="12192000" cy="457200"/>
-          </a:xfrm>
-          <a:prstGeom prst="rect">
-            <a:avLst/>
-          </a:prstGeom>
-          <a:solidFill>
-            <a:srgbClr val="FFFFFF"/>
-          </a:solidFill>
-          <a:ln>
-            <a:noFill/>
-          </a:ln>
-          <a:effectLst/>
-          <a:extLst>
-            <a:ext uri="{91240B29-F687-4F45-9708-019B960494DF}">
-              <a14:hiddenLine xmlns:a14="http://schemas.microsoft.com/office/drawing/2010/main" w="9525">
-                <a:solidFill>
-                  <a:schemeClr val="tx1"/>
-                </a:solidFill>
-                <a:miter lim="800000"/>
-                <a:headEnd/>
-                <a:tailEnd/>
-              </a14:hiddenLine>
-            </a:ext>
-            <a:ext uri="{AF507438-7753-43E0-B8FC-AC1667EBCBE1}">
-              <a14:hiddenEffects xmlns:a14="http://schemas.microsoft.com/office/drawing/2010/main">
-                <a:effectLst>
-                  <a:outerShdw dist="35921" dir="2700000" algn="ctr" rotWithShape="0">
-                    <a:schemeClr val="bg2"/>
-                  </a:outerShdw>
-                </a:effectLst>
-              </a14:hiddenEffects>
-            </a:ext>
-          </a:extLst>
-        </p:spPr>
-        <p:txBody>
-          <a:bodyPr vert="horz" wrap="none" lIns="0" tIns="0" rIns="0" bIns="0" numCol="1" anchor="ctr" anchorCtr="0" compatLnSpc="1">
-            <a:prstTxWarp prst="textNoShape">
-              <a:avLst/>
-            </a:prstTxWarp>
-            <a:spAutoFit/>
-          </a:bodyPr>
-          <a:lstStyle/>
-          <a:p>
-            <a:pPr marL="0" marR="0" lvl="0" indent="0" algn="l" defTabSz="914400" rtl="0" eaLnBrk="0" fontAlgn="base" latinLnBrk="0" hangingPunct="0">
-              <a:lnSpc>
-                <a:spcPct val="100000"/>
-              </a:lnSpc>
-              <a:spcBef>
-                <a:spcPct val="0"/>
-              </a:spcBef>
-              <a:spcAft>
-                <a:spcPct val="0"/>
-              </a:spcAft>
-              <a:buClrTx/>
-              <a:buSzTx/>
-              <a:buFontTx/>
-              <a:buNone/>
-              <a:tabLst/>
-            </a:pPr>
-            <a:r>
-              <a:rPr kumimoji="0" lang="en-US" altLang="en-US" sz="1000" b="0" i="0" u="none" strike="noStrike" cap="none" normalizeH="0" baseline="0">
-                <a:ln>
-                  <a:noFill/>
-                </a:ln>
-                <a:solidFill>
-                  <a:srgbClr val="000000"/>
-                </a:solidFill>
-                <a:effectLst/>
-                <a:latin typeface="Courier New" panose="02070309020205020404" pitchFamily="49" charset="0"/>
-              </a:rPr>
-              <a:t>The correlation between both factors is 0.75</a:t>
-            </a:r>
-            <a:r>
-              <a:rPr kumimoji="0" lang="en-US" altLang="en-US" sz="800" b="0" i="0" u="none" strike="noStrike" cap="none" normalizeH="0" baseline="0">
-                <a:ln>
-                  <a:noFill/>
-                </a:ln>
-                <a:solidFill>
-                  <a:schemeClr val="tx1"/>
-                </a:solidFill>
-                <a:effectLst/>
-              </a:rPr>
-              <a:t> </a:t>
-            </a:r>
-            <a:endParaRPr kumimoji="0" lang="en-US" altLang="en-US" sz="1800" b="0" i="0" u="none" strike="noStrike" cap="none" normalizeH="0" baseline="0">
-              <a:ln>
-                <a:noFill/>
-              </a:ln>
-              <a:solidFill>
-                <a:schemeClr val="tx1"/>
-              </a:solidFill>
-              <a:effectLst/>
-              <a:latin typeface="Arial" panose="020B0604020202020204" pitchFamily="34" charset="0"/>
-            </a:endParaRPr>
-          </a:p>
-        </p:txBody>
-      </p:sp>
-      <p:sp>
-        <p:nvSpPr>
-          <p:cNvPr id="12" name="TextBox 11">
-            <a:extLst>
-              <a:ext uri="{FF2B5EF4-FFF2-40B4-BE49-F238E27FC236}">
-                <a16:creationId xmlns:a16="http://schemas.microsoft.com/office/drawing/2014/main" id="{EEB4A170-3B65-4376-9960-F38F59068B97}"/>
-              </a:ext>
-            </a:extLst>
-          </p:cNvPr>
-          <p:cNvSpPr txBox="1"/>
-          <p:nvPr/>
-        </p:nvSpPr>
-        <p:spPr>
-          <a:xfrm>
-            <a:off x="6027261" y="3124884"/>
-            <a:ext cx="6098144" cy="2862322"/>
-          </a:xfrm>
-          <a:prstGeom prst="rect">
-            <a:avLst/>
-          </a:prstGeom>
-          <a:noFill/>
-        </p:spPr>
-        <p:txBody>
-          <a:bodyPr wrap="none" rtlCol="0">
-            <a:spAutoFit/>
-          </a:bodyPr>
-          <a:lstStyle/>
-          <a:p>
-            <a:pPr marL="285750" indent="-285750">
-              <a:buFontTx/>
-              <a:buChar char="-"/>
-            </a:pPr>
-            <a:r>
-              <a:rPr lang="en-AU" dirty="0"/>
-              <a:t>The Scatter Chart Shows the relationship</a:t>
-            </a:r>
-          </a:p>
-          <a:p>
-            <a:r>
-              <a:rPr lang="en-AU" dirty="0"/>
-              <a:t>     between the Fast-food Restaurants availability</a:t>
-            </a:r>
-          </a:p>
-          <a:p>
-            <a:r>
-              <a:rPr lang="en-AU" dirty="0"/>
-              <a:t>     for every 10K Residents (Capita)</a:t>
-            </a:r>
-          </a:p>
-          <a:p>
-            <a:endParaRPr lang="en-AU" dirty="0"/>
-          </a:p>
-          <a:p>
-            <a:pPr marL="285750" indent="-285750">
-              <a:buFontTx/>
-              <a:buChar char="-"/>
-            </a:pPr>
-            <a:r>
-              <a:rPr lang="en-US" dirty="0"/>
-              <a:t>The more accessible the fast-food restaurant </a:t>
-            </a:r>
-          </a:p>
-          <a:p>
-            <a:r>
-              <a:rPr lang="en-US" dirty="0"/>
-              <a:t>    the higher the obesity rate</a:t>
-            </a:r>
-          </a:p>
-          <a:p>
-            <a:endParaRPr lang="en-US" dirty="0"/>
-          </a:p>
-          <a:p>
-            <a:pPr marL="285750" indent="-285750">
-              <a:buFontTx/>
-              <a:buChar char="-"/>
-            </a:pPr>
-            <a:r>
-              <a:rPr lang="en-US" dirty="0"/>
-              <a:t>Availability of Fast-Food Restaurants are one </a:t>
-            </a:r>
-          </a:p>
-          <a:p>
-            <a:r>
-              <a:rPr lang="en-US" dirty="0"/>
-              <a:t>    of many factors behind the higher obesity among</a:t>
-            </a:r>
-          </a:p>
-          <a:p>
-            <a:r>
-              <a:rPr lang="en-US" dirty="0"/>
-              <a:t>    the states in US</a:t>
-            </a:r>
-            <a:endParaRPr lang="en-AU" dirty="0"/>
-          </a:p>
-        </p:txBody>
-      </p:sp>
-    </p:spTree>
-    <p:extLst>
-      <p:ext uri="{BB962C8B-B14F-4D97-AF65-F5344CB8AC3E}">
-        <p14:creationId xmlns:p14="http://schemas.microsoft.com/office/powerpoint/2010/main" val="2399947885"/>
       </p:ext>
     </p:extLst>
   </p:cSld>

</xml_diff>